<commit_message>
Updates for connect recordings
</commit_message>
<xml_diff>
--- a/AzureContainerRegistry/AzureContainerRegistryOverview.pptx
+++ b/AzureContainerRegistry/AzureContainerRegistryOverview.pptx
@@ -1147,7 +1147,7 @@
   <dgm:whole/>
   <dgm:extLst>
     <a:ext uri="http://schemas.microsoft.com/office/drawing/2008/diagram">
-      <dsp:dataModelExt xmlns:dsp="http://schemas.microsoft.com/office/drawing/2008/diagram" relId="rId8" minVer="http://schemas.openxmlformats.org/drawingml/2006/diagram"/>
+      <dsp:dataModelExt xmlns:dsp="http://schemas.microsoft.com/office/drawing/2008/diagram" relId="rId7" minVer="http://schemas.openxmlformats.org/drawingml/2006/diagram"/>
     </a:ext>
   </dgm:extLst>
 </dgm:dataModel>
@@ -1168,8 +1168,8 @@
       </dsp:nvSpPr>
       <dsp:spPr>
         <a:xfrm>
-          <a:off x="2117" y="16004"/>
-          <a:ext cx="2200066" cy="849225"/>
+          <a:off x="2016" y="15245"/>
+          <a:ext cx="2095685" cy="808934"/>
         </a:xfrm>
         <a:prstGeom prst="chevron">
           <a:avLst>
@@ -1219,8 +1219,8 @@
       </dsp:nvSpPr>
       <dsp:spPr>
         <a:xfrm>
-          <a:off x="588801" y="228310"/>
-          <a:ext cx="1857833" cy="849225"/>
+          <a:off x="560866" y="217478"/>
+          <a:ext cx="1769690" cy="808934"/>
         </a:xfrm>
         <a:prstGeom prst="roundRect">
           <a:avLst>
@@ -1304,8 +1304,8 @@
         </a:p>
       </dsp:txBody>
       <dsp:txXfrm>
-        <a:off x="613674" y="253183"/>
-        <a:ext cx="1808087" cy="799479"/>
+        <a:off x="584559" y="241171"/>
+        <a:ext cx="1722304" cy="761548"/>
       </dsp:txXfrm>
     </dsp:sp>
     <dsp:sp modelId="{21D41BB9-4704-46BA-87DA-8916E5225295}">
@@ -1315,8 +1315,8 @@
       </dsp:nvSpPr>
       <dsp:spPr>
         <a:xfrm>
-          <a:off x="2515081" y="16004"/>
-          <a:ext cx="2200066" cy="849225"/>
+          <a:off x="2395756" y="15245"/>
+          <a:ext cx="2095685" cy="808934"/>
         </a:xfrm>
         <a:prstGeom prst="chevron">
           <a:avLst>
@@ -1366,8 +1366,8 @@
       </dsp:nvSpPr>
       <dsp:spPr>
         <a:xfrm>
-          <a:off x="3101766" y="228310"/>
-          <a:ext cx="1857833" cy="849225"/>
+          <a:off x="2954605" y="217478"/>
+          <a:ext cx="1769690" cy="808934"/>
         </a:xfrm>
         <a:prstGeom prst="roundRect">
           <a:avLst>
@@ -1456,8 +1456,8 @@
         </a:p>
       </dsp:txBody>
       <dsp:txXfrm>
-        <a:off x="3126639" y="253183"/>
-        <a:ext cx="1808087" cy="799479"/>
+        <a:off x="2978298" y="241171"/>
+        <a:ext cx="1722304" cy="761548"/>
       </dsp:txXfrm>
     </dsp:sp>
   </dsp:spTree>
@@ -2748,7 +2748,7 @@
               <a:rPr lang="en-US" smtClean="0">
                 <a:latin typeface="Segoe UI" pitchFamily="34" charset="0"/>
               </a:rPr>
-              <a:t>11/10/2016 8:01 AM</a:t>
+              <a:t>11/10/2016 9:26 AM</a:t>
             </a:fld>
             <a:endParaRPr lang="en-US" dirty="0">
               <a:latin typeface="Segoe UI" pitchFamily="34" charset="0"/>
@@ -3029,7 +3029,7 @@
           <a:p>
             <a:fld id="{38EEC551-8CDA-4EB6-89BB-2A86C9F091C8}" type="datetime8">
               <a:rPr lang="en-US" smtClean="0"/>
-              <a:t>11/10/2016 8:01 AM</a:t>
+              <a:t>11/10/2016 9:26 AM</a:t>
             </a:fld>
             <a:endParaRPr lang="en-US" dirty="0"/>
           </a:p>
@@ -3396,7 +3396,7 @@
           <a:p>
             <a:fld id="{90EC29EE-A8AD-4CE0-9C0B-116E0D4D7533}" type="datetime8">
               <a:rPr lang="en-US" smtClean="0"/>
-              <a:t>11/10/2016 8:01 AM</a:t>
+              <a:t>11/10/2016 9:26 AM</a:t>
             </a:fld>
             <a:endParaRPr lang="en-US" dirty="0"/>
           </a:p>
@@ -3597,7 +3597,7 @@
           <a:p>
             <a:fld id="{38EEC551-8CDA-4EB6-89BB-2A86C9F091C8}" type="datetime8">
               <a:rPr lang="en-US" smtClean="0"/>
-              <a:t>11/10/2016 8:01 AM</a:t>
+              <a:t>11/10/2016 9:26 AM</a:t>
             </a:fld>
             <a:endParaRPr lang="en-US" dirty="0"/>
           </a:p>
@@ -24617,13 +24617,13 @@
   <p:clrMapOvr>
     <a:masterClrMapping/>
   </p:clrMapOvr>
-  <mc:AlternateContent xmlns:mc="http://schemas.openxmlformats.org/markup-compatibility/2006" xmlns:p14="http://schemas.microsoft.com/office/powerpoint/2010/main">
-    <mc:Choice Requires="p14">
-      <p:transition spd="slow" p14:dur="3400">
+  <mc:AlternateContent xmlns:mc="http://schemas.openxmlformats.org/markup-compatibility/2006">
+    <mc:Choice xmlns:p14="http://schemas.microsoft.com/office/powerpoint/2010/main" Requires="p14">
+      <p:transition spd="slow">
         <p14:reveal/>
       </p:transition>
     </mc:Choice>
-    <mc:Fallback xmlns="">
+    <mc:Fallback>
       <p:transition spd="slow">
         <p:fade/>
       </p:transition>
@@ -24737,7 +24737,7 @@
         </p:blipFill>
         <p:spPr bwMode="auto">
           <a:xfrm>
-            <a:off x="6904037" y="4526623"/>
+            <a:off x="2636837" y="4856010"/>
             <a:ext cx="2857500" cy="771525"/>
           </a:xfrm>
           <a:prstGeom prst="rect">
@@ -24778,7 +24778,7 @@
         </p:blipFill>
         <p:spPr bwMode="auto">
           <a:xfrm>
-            <a:off x="2636837" y="3339096"/>
+            <a:off x="503237" y="3447410"/>
             <a:ext cx="2857500" cy="1030097"/>
           </a:xfrm>
           <a:prstGeom prst="rect">
@@ -24839,48 +24839,6 @@
       </p:grpSpPr>
       <p:sp>
         <p:nvSpPr>
-          <p:cNvPr id="5" name="Text Placeholder 4"/>
-          <p:cNvSpPr>
-            <a:spLocks noGrp="1"/>
-          </p:cNvSpPr>
-          <p:nvPr>
-            <p:ph type="body" sz="quarter" idx="10"/>
-          </p:nvPr>
-        </p:nvSpPr>
-        <p:spPr>
-          <a:xfrm>
-            <a:off x="579437" y="6023789"/>
-            <a:ext cx="6248400" cy="572464"/>
-          </a:xfrm>
-        </p:spPr>
-        <p:txBody>
-          <a:bodyPr/>
-          <a:lstStyle/>
-          <a:p>
-            <a:pPr marL="0" indent="0">
-              <a:buNone/>
-            </a:pPr>
-            <a:r>
-              <a:rPr lang="en-US" sz="2800" dirty="0">
-                <a:hlinkClick r:id="rId2"/>
-              </a:rPr>
-              <a:t>aka.ms/</a:t>
-            </a:r>
-            <a:r>
-              <a:rPr lang="en-US" sz="2800" dirty="0" err="1">
-                <a:hlinkClick r:id="rId2"/>
-              </a:rPr>
-              <a:t>AzureContainerRegistry</a:t>
-            </a:r>
-            <a:r>
-              <a:rPr lang="en-US" sz="2800" dirty="0"/>
-              <a:t> </a:t>
-            </a:r>
-          </a:p>
-        </p:txBody>
-      </p:sp>
-      <p:sp>
-        <p:nvSpPr>
           <p:cNvPr id="2" name="Title 1"/>
           <p:cNvSpPr>
             <a:spLocks noGrp="1"/>
@@ -24910,14 +24868,14 @@
           <p:nvPr/>
         </p:nvPicPr>
         <p:blipFill>
-          <a:blip r:embed="rId3"/>
+          <a:blip r:embed="rId2"/>
           <a:stretch>
             <a:fillRect/>
           </a:stretch>
         </p:blipFill>
         <p:spPr>
           <a:xfrm>
-            <a:off x="346077" y="1341695"/>
+            <a:off x="346077" y="1076395"/>
             <a:ext cx="7467600" cy="4562772"/>
           </a:xfrm>
           <a:prstGeom prst="rect">
@@ -24932,21 +24890,63 @@
           <p:nvPr>
             <p:extLst>
               <p:ext uri="{D42A27DB-BD31-4B8C-83A1-F6EECF244321}">
-                <p14:modId xmlns:p14="http://schemas.microsoft.com/office/powerpoint/2010/main" val="1310585788"/>
+                <p14:modId xmlns:p14="http://schemas.microsoft.com/office/powerpoint/2010/main" val="1020413671"/>
               </p:ext>
             </p:extLst>
           </p:nvPr>
         </p:nvGraphicFramePr>
         <p:xfrm>
-          <a:off x="7132637" y="5763251"/>
-          <a:ext cx="4961717" cy="1093541"/>
+          <a:off x="7513637" y="295274"/>
+          <a:ext cx="4726313" cy="1041659"/>
         </p:xfrm>
         <a:graphic>
           <a:graphicData uri="http://schemas.openxmlformats.org/drawingml/2006/diagram">
-            <dgm:relIds xmlns:dgm="http://schemas.openxmlformats.org/drawingml/2006/diagram" xmlns:r="http://schemas.openxmlformats.org/officeDocument/2006/relationships" r:dm="rId4" r:lo="rId5" r:qs="rId6" r:cs="rId7"/>
+            <dgm:relIds xmlns:dgm="http://schemas.openxmlformats.org/drawingml/2006/diagram" xmlns:r="http://schemas.openxmlformats.org/officeDocument/2006/relationships" r:dm="rId3" r:lo="rId4" r:qs="rId5" r:cs="rId6"/>
           </a:graphicData>
         </a:graphic>
       </p:graphicFrame>
+      <p:sp>
+        <p:nvSpPr>
+          <p:cNvPr id="5" name="Text Placeholder 4"/>
+          <p:cNvSpPr>
+            <a:spLocks noGrp="1"/>
+          </p:cNvSpPr>
+          <p:nvPr>
+            <p:ph type="body" sz="quarter" idx="10"/>
+          </p:nvPr>
+        </p:nvSpPr>
+        <p:spPr>
+          <a:xfrm>
+            <a:off x="382736" y="6134056"/>
+            <a:ext cx="6248400" cy="572464"/>
+          </a:xfrm>
+        </p:spPr>
+        <p:txBody>
+          <a:bodyPr/>
+          <a:lstStyle/>
+          <a:p>
+            <a:pPr marL="0" indent="0">
+              <a:buNone/>
+            </a:pPr>
+            <a:r>
+              <a:rPr lang="en-US" sz="2800" dirty="0">
+                <a:hlinkClick r:id="rId8"/>
+              </a:rPr>
+              <a:t>aka.ms/</a:t>
+            </a:r>
+            <a:r>
+              <a:rPr lang="en-US" sz="2800" dirty="0" err="1">
+                <a:hlinkClick r:id="rId8"/>
+              </a:rPr>
+              <a:t>AzureContainerRegistry</a:t>
+            </a:r>
+            <a:r>
+              <a:rPr lang="en-US" sz="2800" dirty="0"/>
+              <a:t> `</a:t>
+            </a:r>
+          </a:p>
+        </p:txBody>
+      </p:sp>
     </p:spTree>
     <p:extLst>
       <p:ext uri="{BB962C8B-B14F-4D97-AF65-F5344CB8AC3E}">
@@ -26143,6 +26143,93 @@
 </file>
 
 <file path=customXml/item1.xml><?xml version="1.0" encoding="utf-8"?>
+<p:properties xmlns:p="http://schemas.microsoft.com/office/2006/metadata/properties" xmlns:xsi="http://www.w3.org/2001/XMLSchema-instance" xmlns:pc="http://schemas.microsoft.com/office/infopath/2007/PartnerControls">
+  <documentManagement>
+    <LikesCount xmlns="http://schemas.microsoft.com/sharepoint/v3" xsi:nil="true"/>
+    <d12e2661e9634d9aa98bbb375f31aced xmlns="01c77077-aee4-4b5f-bd4e-9cd40a6fff29">
+      <Terms xmlns="http://schemas.microsoft.com/office/infopath/2007/PartnerControls">
+        <TermInfo xmlns="http://schemas.microsoft.com/office/infopath/2007/PartnerControls">
+          <TermName xmlns="http://schemas.microsoft.com/office/infopath/2007/PartnerControls">Moscone Center</TermName>
+          <TermId xmlns="http://schemas.microsoft.com/office/infopath/2007/PartnerControls">d4f36a2e-dd0d-4424-990f-7c93b4e9f063</TermId>
+        </TermInfo>
+      </Terms>
+    </d12e2661e9634d9aa98bbb375f31aced>
+    <Event_x0020_Start_x0020_Date xmlns="01c77077-aee4-4b5f-bd4e-9cd40a6fff29">2016-03-30T07:00:00+00:00</Event_x0020_Start_x0020_Date>
+    <Target_x0020_Audiences xmlns="8ff673fc-3231-4e3a-893b-6d7f7cd32766" xsi:nil="true"/>
+    <iaa5f83406f94009a0f6a3e890699ff7 xmlns="01c77077-aee4-4b5f-bd4e-9cd40a6fff29">
+      <Terms xmlns="http://schemas.microsoft.com/office/infopath/2007/PartnerControls">
+        <TermInfo xmlns="http://schemas.microsoft.com/office/infopath/2007/PartnerControls">
+          <TermName xmlns="http://schemas.microsoft.com/office/infopath/2007/PartnerControls">San Francisco</TermName>
+          <TermId xmlns="http://schemas.microsoft.com/office/infopath/2007/PartnerControls">84dfcb53-432b-499d-8965-93d483d36b4a</TermId>
+        </TermInfo>
+      </Terms>
+    </iaa5f83406f94009a0f6a3e890699ff7>
+    <External_x0020_Speaker xmlns="01c77077-aee4-4b5f-bd4e-9cd40a6fff29" xsi:nil="true"/>
+    <m6878b9dd7994da4ba144f95347d99c6 xmlns="01c77077-aee4-4b5f-bd4e-9cd40a6fff29">
+      <Terms xmlns="http://schemas.microsoft.com/office/infopath/2007/PartnerControls"/>
+    </m6878b9dd7994da4ba144f95347d99c6>
+    <Presentation_x0020_Date xmlns="01c77077-aee4-4b5f-bd4e-9cd40a6fff29" xsi:nil="true"/>
+    <fc15c16204564de583b4c942b10d19ec xmlns="01c77077-aee4-4b5f-bd4e-9cd40a6fff29">
+      <Terms xmlns="http://schemas.microsoft.com/office/infopath/2007/PartnerControls"/>
+    </fc15c16204564de583b4c942b10d19ec>
+    <mb2e01f7e2d8413988e28e59aa226eec xmlns="01c77077-aee4-4b5f-bd4e-9cd40a6fff29">
+      <Terms xmlns="http://schemas.microsoft.com/office/infopath/2007/PartnerControls">
+        <TermInfo xmlns="http://schemas.microsoft.com/office/infopath/2007/PartnerControls">
+          <TermName xmlns="http://schemas.microsoft.com/office/infopath/2007/PartnerControls">Build</TermName>
+          <TermId xmlns="http://schemas.microsoft.com/office/infopath/2007/PartnerControls">58542b36-5bf5-46a6-a53f-a41fb7a73785</TermId>
+        </TermInfo>
+      </Terms>
+    </mb2e01f7e2d8413988e28e59aa226eec>
+    <MS_x0020_Content_x0020_Owner xmlns="01c77077-aee4-4b5f-bd4e-9cd40a6fff29">
+      <UserInfo>
+        <DisplayName/>
+        <AccountId xsi:nil="true"/>
+        <AccountType/>
+      </UserInfo>
+    </MS_x0020_Content_x0020_Owner>
+    <Session_x0020_Code xmlns="01c77077-aee4-4b5f-bd4e-9cd40a6fff29" xsi:nil="true"/>
+    <Event_x0020_End_x0020_Date xmlns="01c77077-aee4-4b5f-bd4e-9cd40a6fff29">2016-04-01T07:00:00+00:00</Event_x0020_End_x0020_Date>
+    <o1010385baed4da9b5076a6aa651d1e5 xmlns="01c77077-aee4-4b5f-bd4e-9cd40a6fff29">
+      <Terms xmlns="http://schemas.microsoft.com/office/infopath/2007/PartnerControls"/>
+    </o1010385baed4da9b5076a6aa651d1e5>
+    <kc6d1bd9a46e4e5fbbbf99ca3de7a092 xmlns="01c77077-aee4-4b5f-bd4e-9cd40a6fff29">
+      <Terms xmlns="http://schemas.microsoft.com/office/infopath/2007/PartnerControls"/>
+    </kc6d1bd9a46e4e5fbbbf99ca3de7a092>
+    <MS_x0020_Speaker xmlns="01c77077-aee4-4b5f-bd4e-9cd40a6fff29">
+      <UserInfo>
+        <DisplayName/>
+        <AccountId xsi:nil="true"/>
+        <AccountType/>
+      </UserInfo>
+    </MS_x0020_Speaker>
+    <TaxKeywordTaxHTField xmlns="230e9df3-be65-4c73-a93b-d1236ebd677e">
+      <Terms xmlns="http://schemas.microsoft.com/office/infopath/2007/PartnerControls">
+        <TermInfo xmlns="http://schemas.microsoft.com/office/infopath/2007/PartnerControls">
+          <TermName xmlns="http://schemas.microsoft.com/office/infopath/2007/PartnerControls">Microsoft Build 2016</TermName>
+          <TermId xmlns="http://schemas.microsoft.com/office/infopath/2007/PartnerControls">da8a10b5-9bc3-4217-80aa-6b60d6ec1cee</TermId>
+        </TermInfo>
+      </Terms>
+    </TaxKeywordTaxHTField>
+    <TaxCatchAll xmlns="230e9df3-be65-4c73-a93b-d1236ebd677e">
+      <Value>48</Value>
+      <Value>47</Value>
+      <Value>46</Value>
+      <Value>49</Value>
+    </TaxCatchAll>
+  </documentManagement>
+</p:properties>
+</file>
+
+<file path=customXml/item2.xml><?xml version="1.0" encoding="utf-8"?>
+<?mso-contentType ?>
+<FormTemplates xmlns="http://schemas.microsoft.com/sharepoint/v3/contenttype/forms">
+  <Display>DocumentLibraryForm</Display>
+  <Edit>DocumentLibraryForm</Edit>
+  <New>DocumentLibraryForm</New>
+</FormTemplates>
+</file>
+
+<file path=customXml/item3.xml><?xml version="1.0" encoding="utf-8"?>
 <ct:contentTypeSchema xmlns:ct="http://schemas.microsoft.com/office/2006/metadata/contentType" xmlns:ma="http://schemas.microsoft.com/office/2006/metadata/properties/metaAttributes" ct:_="" ma:_="" ma:contentTypeName="PresentationsDoc" ma:contentTypeID="0x01010031DCF4CA090F824DB1E4CCBB6B9D64EA00101E8AAD132F8F4D96340D6376C8BB3E" ma:contentTypeVersion="21" ma:contentTypeDescription="" ma:contentTypeScope="" ma:versionID="264624295c8b52c397a103286eb3d87c">
   <xsd:schema xmlns:xsd="http://www.w3.org/2001/XMLSchema" xmlns:xs="http://www.w3.org/2001/XMLSchema" xmlns:p="http://schemas.microsoft.com/office/2006/metadata/properties" xmlns:ns1="http://schemas.microsoft.com/sharepoint/v3" xmlns:ns2="01c77077-aee4-4b5f-bd4e-9cd40a6fff29" xmlns:ns3="230e9df3-be65-4c73-a93b-d1236ebd677e" xmlns:ns5="8ff673fc-3231-4e3a-893b-6d7f7cd32766" targetNamespace="http://schemas.microsoft.com/office/2006/metadata/properties" ma:root="true" ma:fieldsID="795b20f19f95dfa6d1f4d708b4ec8d36" ns1:_="" ns2:_="" ns3:_="" ns5:_="">
     <xsd:import namespace="http://schemas.microsoft.com/sharepoint/v3"/>
@@ -26491,94 +26578,34 @@
 </ct:contentTypeSchema>
 </file>
 
-<file path=customXml/item2.xml><?xml version="1.0" encoding="utf-8"?>
-<?mso-contentType ?>
-<FormTemplates xmlns="http://schemas.microsoft.com/sharepoint/v3/contenttype/forms">
-  <Display>DocumentLibraryForm</Display>
-  <Edit>DocumentLibraryForm</Edit>
-  <New>DocumentLibraryForm</New>
-</FormTemplates>
+<file path=customXml/itemProps1.xml><?xml version="1.0" encoding="utf-8"?>
+<ds:datastoreItem xmlns:ds="http://schemas.openxmlformats.org/officeDocument/2006/customXml" ds:itemID="{F990F116-B58F-4255-B05B-DA3808E0E5C6}">
+  <ds:schemaRefs>
+    <ds:schemaRef ds:uri="01c77077-aee4-4b5f-bd4e-9cd40a6fff29"/>
+    <ds:schemaRef ds:uri="230e9df3-be65-4c73-a93b-d1236ebd677e"/>
+    <ds:schemaRef ds:uri="http://purl.org/dc/terms/"/>
+    <ds:schemaRef ds:uri="8ff673fc-3231-4e3a-893b-6d7f7cd32766"/>
+    <ds:schemaRef ds:uri="http://schemas.microsoft.com/office/2006/documentManagement/types"/>
+    <ds:schemaRef ds:uri="http://schemas.microsoft.com/office/infopath/2007/PartnerControls"/>
+    <ds:schemaRef ds:uri="http://schemas.openxmlformats.org/package/2006/metadata/core-properties"/>
+    <ds:schemaRef ds:uri="http://purl.org/dc/elements/1.1/"/>
+    <ds:schemaRef ds:uri="http://schemas.microsoft.com/office/2006/metadata/properties"/>
+    <ds:schemaRef ds:uri="http://schemas.microsoft.com/sharepoint/v3"/>
+    <ds:schemaRef ds:uri="http://www.w3.org/XML/1998/namespace"/>
+    <ds:schemaRef ds:uri="http://purl.org/dc/dcmitype/"/>
+  </ds:schemaRefs>
+</ds:datastoreItem>
 </file>
 
-<file path=customXml/item3.xml><?xml version="1.0" encoding="utf-8"?>
-<p:properties xmlns:p="http://schemas.microsoft.com/office/2006/metadata/properties" xmlns:xsi="http://www.w3.org/2001/XMLSchema-instance" xmlns:pc="http://schemas.microsoft.com/office/infopath/2007/PartnerControls">
-  <documentManagement>
-    <LikesCount xmlns="http://schemas.microsoft.com/sharepoint/v3" xsi:nil="true"/>
-    <d12e2661e9634d9aa98bbb375f31aced xmlns="01c77077-aee4-4b5f-bd4e-9cd40a6fff29">
-      <Terms xmlns="http://schemas.microsoft.com/office/infopath/2007/PartnerControls">
-        <TermInfo xmlns="http://schemas.microsoft.com/office/infopath/2007/PartnerControls">
-          <TermName xmlns="http://schemas.microsoft.com/office/infopath/2007/PartnerControls">Moscone Center</TermName>
-          <TermId xmlns="http://schemas.microsoft.com/office/infopath/2007/PartnerControls">d4f36a2e-dd0d-4424-990f-7c93b4e9f063</TermId>
-        </TermInfo>
-      </Terms>
-    </d12e2661e9634d9aa98bbb375f31aced>
-    <Event_x0020_Start_x0020_Date xmlns="01c77077-aee4-4b5f-bd4e-9cd40a6fff29">2016-03-30T07:00:00+00:00</Event_x0020_Start_x0020_Date>
-    <Target_x0020_Audiences xmlns="8ff673fc-3231-4e3a-893b-6d7f7cd32766" xsi:nil="true"/>
-    <iaa5f83406f94009a0f6a3e890699ff7 xmlns="01c77077-aee4-4b5f-bd4e-9cd40a6fff29">
-      <Terms xmlns="http://schemas.microsoft.com/office/infopath/2007/PartnerControls">
-        <TermInfo xmlns="http://schemas.microsoft.com/office/infopath/2007/PartnerControls">
-          <TermName xmlns="http://schemas.microsoft.com/office/infopath/2007/PartnerControls">San Francisco</TermName>
-          <TermId xmlns="http://schemas.microsoft.com/office/infopath/2007/PartnerControls">84dfcb53-432b-499d-8965-93d483d36b4a</TermId>
-        </TermInfo>
-      </Terms>
-    </iaa5f83406f94009a0f6a3e890699ff7>
-    <External_x0020_Speaker xmlns="01c77077-aee4-4b5f-bd4e-9cd40a6fff29" xsi:nil="true"/>
-    <m6878b9dd7994da4ba144f95347d99c6 xmlns="01c77077-aee4-4b5f-bd4e-9cd40a6fff29">
-      <Terms xmlns="http://schemas.microsoft.com/office/infopath/2007/PartnerControls"/>
-    </m6878b9dd7994da4ba144f95347d99c6>
-    <Presentation_x0020_Date xmlns="01c77077-aee4-4b5f-bd4e-9cd40a6fff29" xsi:nil="true"/>
-    <fc15c16204564de583b4c942b10d19ec xmlns="01c77077-aee4-4b5f-bd4e-9cd40a6fff29">
-      <Terms xmlns="http://schemas.microsoft.com/office/infopath/2007/PartnerControls"/>
-    </fc15c16204564de583b4c942b10d19ec>
-    <mb2e01f7e2d8413988e28e59aa226eec xmlns="01c77077-aee4-4b5f-bd4e-9cd40a6fff29">
-      <Terms xmlns="http://schemas.microsoft.com/office/infopath/2007/PartnerControls">
-        <TermInfo xmlns="http://schemas.microsoft.com/office/infopath/2007/PartnerControls">
-          <TermName xmlns="http://schemas.microsoft.com/office/infopath/2007/PartnerControls">Build</TermName>
-          <TermId xmlns="http://schemas.microsoft.com/office/infopath/2007/PartnerControls">58542b36-5bf5-46a6-a53f-a41fb7a73785</TermId>
-        </TermInfo>
-      </Terms>
-    </mb2e01f7e2d8413988e28e59aa226eec>
-    <MS_x0020_Content_x0020_Owner xmlns="01c77077-aee4-4b5f-bd4e-9cd40a6fff29">
-      <UserInfo>
-        <DisplayName/>
-        <AccountId xsi:nil="true"/>
-        <AccountType/>
-      </UserInfo>
-    </MS_x0020_Content_x0020_Owner>
-    <Session_x0020_Code xmlns="01c77077-aee4-4b5f-bd4e-9cd40a6fff29" xsi:nil="true"/>
-    <Event_x0020_End_x0020_Date xmlns="01c77077-aee4-4b5f-bd4e-9cd40a6fff29">2016-04-01T07:00:00+00:00</Event_x0020_End_x0020_Date>
-    <o1010385baed4da9b5076a6aa651d1e5 xmlns="01c77077-aee4-4b5f-bd4e-9cd40a6fff29">
-      <Terms xmlns="http://schemas.microsoft.com/office/infopath/2007/PartnerControls"/>
-    </o1010385baed4da9b5076a6aa651d1e5>
-    <kc6d1bd9a46e4e5fbbbf99ca3de7a092 xmlns="01c77077-aee4-4b5f-bd4e-9cd40a6fff29">
-      <Terms xmlns="http://schemas.microsoft.com/office/infopath/2007/PartnerControls"/>
-    </kc6d1bd9a46e4e5fbbbf99ca3de7a092>
-    <MS_x0020_Speaker xmlns="01c77077-aee4-4b5f-bd4e-9cd40a6fff29">
-      <UserInfo>
-        <DisplayName/>
-        <AccountId xsi:nil="true"/>
-        <AccountType/>
-      </UserInfo>
-    </MS_x0020_Speaker>
-    <TaxKeywordTaxHTField xmlns="230e9df3-be65-4c73-a93b-d1236ebd677e">
-      <Terms xmlns="http://schemas.microsoft.com/office/infopath/2007/PartnerControls">
-        <TermInfo xmlns="http://schemas.microsoft.com/office/infopath/2007/PartnerControls">
-          <TermName xmlns="http://schemas.microsoft.com/office/infopath/2007/PartnerControls">Microsoft Build 2016</TermName>
-          <TermId xmlns="http://schemas.microsoft.com/office/infopath/2007/PartnerControls">da8a10b5-9bc3-4217-80aa-6b60d6ec1cee</TermId>
-        </TermInfo>
-      </Terms>
-    </TaxKeywordTaxHTField>
-    <TaxCatchAll xmlns="230e9df3-be65-4c73-a93b-d1236ebd677e">
-      <Value>48</Value>
-      <Value>47</Value>
-      <Value>46</Value>
-      <Value>49</Value>
-    </TaxCatchAll>
-  </documentManagement>
-</p:properties>
+<file path=customXml/itemProps2.xml><?xml version="1.0" encoding="utf-8"?>
+<ds:datastoreItem xmlns:ds="http://schemas.openxmlformats.org/officeDocument/2006/customXml" ds:itemID="{758FDAC0-319D-4A54-8D8E-1D42CB1F8004}">
+  <ds:schemaRefs>
+    <ds:schemaRef ds:uri="http://schemas.microsoft.com/sharepoint/v3/contenttype/forms"/>
+  </ds:schemaRefs>
+</ds:datastoreItem>
 </file>
 
-<file path=customXml/itemProps1.xml><?xml version="1.0" encoding="utf-8"?>
+<file path=customXml/itemProps3.xml><?xml version="1.0" encoding="utf-8"?>
 <ds:datastoreItem xmlns:ds="http://schemas.openxmlformats.org/officeDocument/2006/customXml" ds:itemID="{BAA4D29B-0199-4083-B6CB-53559E57A3C1}">
   <ds:schemaRefs>
     <ds:schemaRef ds:uri="http://schemas.microsoft.com/office/2006/metadata/contentType"/>
@@ -26597,31 +26624,4 @@
     <ds:schemaRef ds:uri="http://schemas.microsoft.com/internal/obd"/>
   </ds:schemaRefs>
 </ds:datastoreItem>
-</file>
-
-<file path=customXml/itemProps2.xml><?xml version="1.0" encoding="utf-8"?>
-<ds:datastoreItem xmlns:ds="http://schemas.openxmlformats.org/officeDocument/2006/customXml" ds:itemID="{758FDAC0-319D-4A54-8D8E-1D42CB1F8004}">
-  <ds:schemaRefs>
-    <ds:schemaRef ds:uri="http://schemas.microsoft.com/sharepoint/v3/contenttype/forms"/>
-  </ds:schemaRefs>
-</ds:datastoreItem>
-</file>
-
-<file path=customXml/itemProps3.xml><?xml version="1.0" encoding="utf-8"?>
-<ds:datastoreItem xmlns:ds="http://schemas.openxmlformats.org/officeDocument/2006/customXml" ds:itemID="{F990F116-B58F-4255-B05B-DA3808E0E5C6}">
-  <ds:schemaRefs>
-    <ds:schemaRef ds:uri="http://schemas.microsoft.com/office/2006/metadata/properties"/>
-    <ds:schemaRef ds:uri="http://purl.org/dc/terms/"/>
-    <ds:schemaRef ds:uri="http://schemas.microsoft.com/sharepoint/v3"/>
-    <ds:schemaRef ds:uri="http://schemas.microsoft.com/office/2006/documentManagement/types"/>
-    <ds:schemaRef ds:uri="01c77077-aee4-4b5f-bd4e-9cd40a6fff29"/>
-    <ds:schemaRef ds:uri="8ff673fc-3231-4e3a-893b-6d7f7cd32766"/>
-    <ds:schemaRef ds:uri="http://purl.org/dc/elements/1.1/"/>
-    <ds:schemaRef ds:uri="http://schemas.microsoft.com/office/infopath/2007/PartnerControls"/>
-    <ds:schemaRef ds:uri="http://schemas.openxmlformats.org/package/2006/metadata/core-properties"/>
-    <ds:schemaRef ds:uri="230e9df3-be65-4c73-a93b-d1236ebd677e"/>
-    <ds:schemaRef ds:uri="http://www.w3.org/XML/1998/namespace"/>
-    <ds:schemaRef ds:uri="http://purl.org/dc/dcmitype/"/>
-  </ds:schemaRefs>
-</ds:datastoreItem>
 </file>
</xml_diff>

<commit_message>
Latest slides, including DockerCon
</commit_message>
<xml_diff>
--- a/AzureContainerRegistry/AzureContainerRegistryOverview.pptx
+++ b/AzureContainerRegistry/AzureContainerRegistryOverview.pptx
@@ -176,2487 +176,8 @@
 </p:cmAuthorLst>
 </file>
 
-<file path=ppt/diagrams/colors1.xml><?xml version="1.0" encoding="utf-8"?>
-<dgm:colorsDef xmlns:dgm="http://schemas.openxmlformats.org/drawingml/2006/diagram" xmlns:a="http://schemas.openxmlformats.org/drawingml/2006/main" uniqueId="urn:microsoft.com/office/officeart/2005/8/colors/accent1_2">
-  <dgm:title val=""/>
-  <dgm:desc val=""/>
-  <dgm:catLst>
-    <dgm:cat type="accent1" pri="11200"/>
-  </dgm:catLst>
-  <dgm:styleLbl name="node0">
-    <dgm:fillClrLst meth="repeat">
-      <a:schemeClr val="accent1"/>
-    </dgm:fillClrLst>
-    <dgm:linClrLst meth="repeat">
-      <a:schemeClr val="lt1"/>
-    </dgm:linClrLst>
-    <dgm:effectClrLst/>
-    <dgm:txLinClrLst/>
-    <dgm:txFillClrLst/>
-    <dgm:txEffectClrLst/>
-  </dgm:styleLbl>
-  <dgm:styleLbl name="alignNode1">
-    <dgm:fillClrLst meth="repeat">
-      <a:schemeClr val="accent1"/>
-    </dgm:fillClrLst>
-    <dgm:linClrLst meth="repeat">
-      <a:schemeClr val="accent1"/>
-    </dgm:linClrLst>
-    <dgm:effectClrLst/>
-    <dgm:txLinClrLst/>
-    <dgm:txFillClrLst/>
-    <dgm:txEffectClrLst/>
-  </dgm:styleLbl>
-  <dgm:styleLbl name="node1">
-    <dgm:fillClrLst meth="repeat">
-      <a:schemeClr val="accent1"/>
-    </dgm:fillClrLst>
-    <dgm:linClrLst meth="repeat">
-      <a:schemeClr val="lt1"/>
-    </dgm:linClrLst>
-    <dgm:effectClrLst/>
-    <dgm:txLinClrLst/>
-    <dgm:txFillClrLst/>
-    <dgm:txEffectClrLst/>
-  </dgm:styleLbl>
-  <dgm:styleLbl name="lnNode1">
-    <dgm:fillClrLst meth="repeat">
-      <a:schemeClr val="accent1"/>
-    </dgm:fillClrLst>
-    <dgm:linClrLst meth="repeat">
-      <a:schemeClr val="lt1"/>
-    </dgm:linClrLst>
-    <dgm:effectClrLst/>
-    <dgm:txLinClrLst/>
-    <dgm:txFillClrLst/>
-    <dgm:txEffectClrLst/>
-  </dgm:styleLbl>
-  <dgm:styleLbl name="vennNode1">
-    <dgm:fillClrLst meth="repeat">
-      <a:schemeClr val="accent1">
-        <a:alpha val="50000"/>
-      </a:schemeClr>
-    </dgm:fillClrLst>
-    <dgm:linClrLst meth="repeat">
-      <a:schemeClr val="lt1"/>
-    </dgm:linClrLst>
-    <dgm:effectClrLst/>
-    <dgm:txLinClrLst/>
-    <dgm:txFillClrLst/>
-    <dgm:txEffectClrLst/>
-  </dgm:styleLbl>
-  <dgm:styleLbl name="node2">
-    <dgm:fillClrLst meth="repeat">
-      <a:schemeClr val="accent1"/>
-    </dgm:fillClrLst>
-    <dgm:linClrLst meth="repeat">
-      <a:schemeClr val="lt1"/>
-    </dgm:linClrLst>
-    <dgm:effectClrLst/>
-    <dgm:txLinClrLst/>
-    <dgm:txFillClrLst/>
-    <dgm:txEffectClrLst/>
-  </dgm:styleLbl>
-  <dgm:styleLbl name="node3">
-    <dgm:fillClrLst meth="repeat">
-      <a:schemeClr val="accent1"/>
-    </dgm:fillClrLst>
-    <dgm:linClrLst meth="repeat">
-      <a:schemeClr val="lt1"/>
-    </dgm:linClrLst>
-    <dgm:effectClrLst/>
-    <dgm:txLinClrLst/>
-    <dgm:txFillClrLst/>
-    <dgm:txEffectClrLst/>
-  </dgm:styleLbl>
-  <dgm:styleLbl name="node4">
-    <dgm:fillClrLst meth="repeat">
-      <a:schemeClr val="accent1"/>
-    </dgm:fillClrLst>
-    <dgm:linClrLst meth="repeat">
-      <a:schemeClr val="lt1"/>
-    </dgm:linClrLst>
-    <dgm:effectClrLst/>
-    <dgm:txLinClrLst/>
-    <dgm:txFillClrLst/>
-    <dgm:txEffectClrLst/>
-  </dgm:styleLbl>
-  <dgm:styleLbl name="fgImgPlace1">
-    <dgm:fillClrLst meth="repeat">
-      <a:schemeClr val="accent1">
-        <a:tint val="50000"/>
-      </a:schemeClr>
-    </dgm:fillClrLst>
-    <dgm:linClrLst meth="repeat">
-      <a:schemeClr val="lt1"/>
-    </dgm:linClrLst>
-    <dgm:effectClrLst/>
-    <dgm:txLinClrLst/>
-    <dgm:txFillClrLst meth="repeat">
-      <a:schemeClr val="lt1"/>
-    </dgm:txFillClrLst>
-    <dgm:txEffectClrLst/>
-  </dgm:styleLbl>
-  <dgm:styleLbl name="alignImgPlace1">
-    <dgm:fillClrLst meth="repeat">
-      <a:schemeClr val="accent1">
-        <a:tint val="50000"/>
-      </a:schemeClr>
-    </dgm:fillClrLst>
-    <dgm:linClrLst meth="repeat">
-      <a:schemeClr val="lt1"/>
-    </dgm:linClrLst>
-    <dgm:effectClrLst/>
-    <dgm:txLinClrLst/>
-    <dgm:txFillClrLst meth="repeat">
-      <a:schemeClr val="lt1"/>
-    </dgm:txFillClrLst>
-    <dgm:txEffectClrLst/>
-  </dgm:styleLbl>
-  <dgm:styleLbl name="bgImgPlace1">
-    <dgm:fillClrLst meth="repeat">
-      <a:schemeClr val="accent1">
-        <a:tint val="50000"/>
-      </a:schemeClr>
-    </dgm:fillClrLst>
-    <dgm:linClrLst meth="repeat">
-      <a:schemeClr val="lt1"/>
-    </dgm:linClrLst>
-    <dgm:effectClrLst/>
-    <dgm:txLinClrLst/>
-    <dgm:txFillClrLst meth="repeat">
-      <a:schemeClr val="lt1"/>
-    </dgm:txFillClrLst>
-    <dgm:txEffectClrLst/>
-  </dgm:styleLbl>
-  <dgm:styleLbl name="sibTrans2D1">
-    <dgm:fillClrLst meth="repeat">
-      <a:schemeClr val="accent1">
-        <a:tint val="60000"/>
-      </a:schemeClr>
-    </dgm:fillClrLst>
-    <dgm:linClrLst meth="repeat">
-      <a:schemeClr val="accent1">
-        <a:tint val="60000"/>
-      </a:schemeClr>
-    </dgm:linClrLst>
-    <dgm:effectClrLst/>
-    <dgm:txLinClrLst/>
-    <dgm:txFillClrLst/>
-    <dgm:txEffectClrLst/>
-  </dgm:styleLbl>
-  <dgm:styleLbl name="fgSibTrans2D1">
-    <dgm:fillClrLst meth="repeat">
-      <a:schemeClr val="accent1">
-        <a:tint val="60000"/>
-      </a:schemeClr>
-    </dgm:fillClrLst>
-    <dgm:linClrLst meth="repeat">
-      <a:schemeClr val="accent1">
-        <a:tint val="60000"/>
-      </a:schemeClr>
-    </dgm:linClrLst>
-    <dgm:effectClrLst/>
-    <dgm:txLinClrLst/>
-    <dgm:txFillClrLst/>
-    <dgm:txEffectClrLst/>
-  </dgm:styleLbl>
-  <dgm:styleLbl name="bgSibTrans2D1">
-    <dgm:fillClrLst meth="repeat">
-      <a:schemeClr val="accent1">
-        <a:tint val="60000"/>
-      </a:schemeClr>
-    </dgm:fillClrLst>
-    <dgm:linClrLst meth="repeat">
-      <a:schemeClr val="accent1">
-        <a:tint val="60000"/>
-      </a:schemeClr>
-    </dgm:linClrLst>
-    <dgm:effectClrLst/>
-    <dgm:txLinClrLst/>
-    <dgm:txFillClrLst/>
-    <dgm:txEffectClrLst/>
-  </dgm:styleLbl>
-  <dgm:styleLbl name="sibTrans1D1">
-    <dgm:fillClrLst meth="repeat">
-      <a:schemeClr val="accent1"/>
-    </dgm:fillClrLst>
-    <dgm:linClrLst meth="repeat">
-      <a:schemeClr val="accent1"/>
-    </dgm:linClrLst>
-    <dgm:effectClrLst/>
-    <dgm:txLinClrLst/>
-    <dgm:txFillClrLst meth="repeat">
-      <a:schemeClr val="tx1"/>
-    </dgm:txFillClrLst>
-    <dgm:txEffectClrLst/>
-  </dgm:styleLbl>
-  <dgm:styleLbl name="callout">
-    <dgm:fillClrLst meth="repeat">
-      <a:schemeClr val="accent1"/>
-    </dgm:fillClrLst>
-    <dgm:linClrLst meth="repeat">
-      <a:schemeClr val="accent1">
-        <a:tint val="50000"/>
-      </a:schemeClr>
-    </dgm:linClrLst>
-    <dgm:effectClrLst/>
-    <dgm:txLinClrLst/>
-    <dgm:txFillClrLst meth="repeat">
-      <a:schemeClr val="tx1"/>
-    </dgm:txFillClrLst>
-    <dgm:txEffectClrLst/>
-  </dgm:styleLbl>
-  <dgm:styleLbl name="asst0">
-    <dgm:fillClrLst meth="repeat">
-      <a:schemeClr val="accent1"/>
-    </dgm:fillClrLst>
-    <dgm:linClrLst meth="repeat">
-      <a:schemeClr val="lt1"/>
-    </dgm:linClrLst>
-    <dgm:effectClrLst/>
-    <dgm:txLinClrLst/>
-    <dgm:txFillClrLst/>
-    <dgm:txEffectClrLst/>
-  </dgm:styleLbl>
-  <dgm:styleLbl name="asst1">
-    <dgm:fillClrLst meth="repeat">
-      <a:schemeClr val="accent1"/>
-    </dgm:fillClrLst>
-    <dgm:linClrLst meth="repeat">
-      <a:schemeClr val="lt1"/>
-    </dgm:linClrLst>
-    <dgm:effectClrLst/>
-    <dgm:txLinClrLst/>
-    <dgm:txFillClrLst/>
-    <dgm:txEffectClrLst/>
-  </dgm:styleLbl>
-  <dgm:styleLbl name="asst2">
-    <dgm:fillClrLst meth="repeat">
-      <a:schemeClr val="accent1"/>
-    </dgm:fillClrLst>
-    <dgm:linClrLst meth="repeat">
-      <a:schemeClr val="lt1"/>
-    </dgm:linClrLst>
-    <dgm:effectClrLst/>
-    <dgm:txLinClrLst/>
-    <dgm:txFillClrLst/>
-    <dgm:txEffectClrLst/>
-  </dgm:styleLbl>
-  <dgm:styleLbl name="asst3">
-    <dgm:fillClrLst meth="repeat">
-      <a:schemeClr val="accent1"/>
-    </dgm:fillClrLst>
-    <dgm:linClrLst meth="repeat">
-      <a:schemeClr val="lt1"/>
-    </dgm:linClrLst>
-    <dgm:effectClrLst/>
-    <dgm:txLinClrLst/>
-    <dgm:txFillClrLst/>
-    <dgm:txEffectClrLst/>
-  </dgm:styleLbl>
-  <dgm:styleLbl name="asst4">
-    <dgm:fillClrLst meth="repeat">
-      <a:schemeClr val="accent1"/>
-    </dgm:fillClrLst>
-    <dgm:linClrLst meth="repeat">
-      <a:schemeClr val="lt1"/>
-    </dgm:linClrLst>
-    <dgm:effectClrLst/>
-    <dgm:txLinClrLst/>
-    <dgm:txFillClrLst/>
-    <dgm:txEffectClrLst/>
-  </dgm:styleLbl>
-  <dgm:styleLbl name="parChTrans2D1">
-    <dgm:fillClrLst meth="repeat">
-      <a:schemeClr val="accent1">
-        <a:tint val="60000"/>
-      </a:schemeClr>
-    </dgm:fillClrLst>
-    <dgm:linClrLst meth="repeat">
-      <a:schemeClr val="accent1">
-        <a:tint val="60000"/>
-      </a:schemeClr>
-    </dgm:linClrLst>
-    <dgm:effectClrLst/>
-    <dgm:txLinClrLst/>
-    <dgm:txFillClrLst meth="repeat">
-      <a:schemeClr val="lt1"/>
-    </dgm:txFillClrLst>
-    <dgm:txEffectClrLst/>
-  </dgm:styleLbl>
-  <dgm:styleLbl name="parChTrans2D2">
-    <dgm:fillClrLst meth="repeat">
-      <a:schemeClr val="accent1"/>
-    </dgm:fillClrLst>
-    <dgm:linClrLst meth="repeat">
-      <a:schemeClr val="accent1"/>
-    </dgm:linClrLst>
-    <dgm:effectClrLst/>
-    <dgm:txLinClrLst/>
-    <dgm:txFillClrLst meth="repeat">
-      <a:schemeClr val="lt1"/>
-    </dgm:txFillClrLst>
-    <dgm:txEffectClrLst/>
-  </dgm:styleLbl>
-  <dgm:styleLbl name="parChTrans2D3">
-    <dgm:fillClrLst meth="repeat">
-      <a:schemeClr val="accent1"/>
-    </dgm:fillClrLst>
-    <dgm:linClrLst meth="repeat">
-      <a:schemeClr val="accent1"/>
-    </dgm:linClrLst>
-    <dgm:effectClrLst/>
-    <dgm:txLinClrLst/>
-    <dgm:txFillClrLst meth="repeat">
-      <a:schemeClr val="lt1"/>
-    </dgm:txFillClrLst>
-    <dgm:txEffectClrLst/>
-  </dgm:styleLbl>
-  <dgm:styleLbl name="parChTrans2D4">
-    <dgm:fillClrLst meth="repeat">
-      <a:schemeClr val="accent1"/>
-    </dgm:fillClrLst>
-    <dgm:linClrLst meth="repeat">
-      <a:schemeClr val="accent1"/>
-    </dgm:linClrLst>
-    <dgm:effectClrLst/>
-    <dgm:txLinClrLst/>
-    <dgm:txFillClrLst meth="repeat">
-      <a:schemeClr val="lt1"/>
-    </dgm:txFillClrLst>
-    <dgm:txEffectClrLst/>
-  </dgm:styleLbl>
-  <dgm:styleLbl name="parChTrans1D1">
-    <dgm:fillClrLst meth="repeat">
-      <a:schemeClr val="accent1"/>
-    </dgm:fillClrLst>
-    <dgm:linClrLst meth="repeat">
-      <a:schemeClr val="accent1">
-        <a:shade val="60000"/>
-      </a:schemeClr>
-    </dgm:linClrLst>
-    <dgm:effectClrLst/>
-    <dgm:txLinClrLst/>
-    <dgm:txFillClrLst meth="repeat">
-      <a:schemeClr val="tx1"/>
-    </dgm:txFillClrLst>
-    <dgm:txEffectClrLst/>
-  </dgm:styleLbl>
-  <dgm:styleLbl name="parChTrans1D2">
-    <dgm:fillClrLst meth="repeat">
-      <a:schemeClr val="accent1"/>
-    </dgm:fillClrLst>
-    <dgm:linClrLst meth="repeat">
-      <a:schemeClr val="accent1">
-        <a:shade val="60000"/>
-      </a:schemeClr>
-    </dgm:linClrLst>
-    <dgm:effectClrLst/>
-    <dgm:txLinClrLst/>
-    <dgm:txFillClrLst meth="repeat">
-      <a:schemeClr val="tx1"/>
-    </dgm:txFillClrLst>
-    <dgm:txEffectClrLst/>
-  </dgm:styleLbl>
-  <dgm:styleLbl name="parChTrans1D3">
-    <dgm:fillClrLst meth="repeat">
-      <a:schemeClr val="accent1"/>
-    </dgm:fillClrLst>
-    <dgm:linClrLst meth="repeat">
-      <a:schemeClr val="accent1">
-        <a:shade val="80000"/>
-      </a:schemeClr>
-    </dgm:linClrLst>
-    <dgm:effectClrLst/>
-    <dgm:txLinClrLst/>
-    <dgm:txFillClrLst meth="repeat">
-      <a:schemeClr val="tx1"/>
-    </dgm:txFillClrLst>
-    <dgm:txEffectClrLst/>
-  </dgm:styleLbl>
-  <dgm:styleLbl name="parChTrans1D4">
-    <dgm:fillClrLst meth="repeat">
-      <a:schemeClr val="accent1"/>
-    </dgm:fillClrLst>
-    <dgm:linClrLst meth="repeat">
-      <a:schemeClr val="accent1">
-        <a:shade val="80000"/>
-      </a:schemeClr>
-    </dgm:linClrLst>
-    <dgm:effectClrLst/>
-    <dgm:txLinClrLst/>
-    <dgm:txFillClrLst meth="repeat">
-      <a:schemeClr val="tx1"/>
-    </dgm:txFillClrLst>
-    <dgm:txEffectClrLst/>
-  </dgm:styleLbl>
-  <dgm:styleLbl name="fgAcc1">
-    <dgm:fillClrLst meth="repeat">
-      <a:schemeClr val="lt1">
-        <a:alpha val="90000"/>
-      </a:schemeClr>
-    </dgm:fillClrLst>
-    <dgm:linClrLst meth="repeat">
-      <a:schemeClr val="accent1"/>
-    </dgm:linClrLst>
-    <dgm:effectClrLst/>
-    <dgm:txLinClrLst/>
-    <dgm:txFillClrLst meth="repeat">
-      <a:schemeClr val="dk1"/>
-    </dgm:txFillClrLst>
-    <dgm:txEffectClrLst/>
-  </dgm:styleLbl>
-  <dgm:styleLbl name="conFgAcc1">
-    <dgm:fillClrLst meth="repeat">
-      <a:schemeClr val="lt1">
-        <a:alpha val="90000"/>
-      </a:schemeClr>
-    </dgm:fillClrLst>
-    <dgm:linClrLst meth="repeat">
-      <a:schemeClr val="accent1"/>
-    </dgm:linClrLst>
-    <dgm:effectClrLst/>
-    <dgm:txLinClrLst/>
-    <dgm:txFillClrLst meth="repeat">
-      <a:schemeClr val="dk1"/>
-    </dgm:txFillClrLst>
-    <dgm:txEffectClrLst/>
-  </dgm:styleLbl>
-  <dgm:styleLbl name="alignAcc1">
-    <dgm:fillClrLst meth="repeat">
-      <a:schemeClr val="lt1">
-        <a:alpha val="90000"/>
-      </a:schemeClr>
-    </dgm:fillClrLst>
-    <dgm:linClrLst meth="repeat">
-      <a:schemeClr val="accent1"/>
-    </dgm:linClrLst>
-    <dgm:effectClrLst/>
-    <dgm:txLinClrLst/>
-    <dgm:txFillClrLst meth="repeat">
-      <a:schemeClr val="dk1"/>
-    </dgm:txFillClrLst>
-    <dgm:txEffectClrLst/>
-  </dgm:styleLbl>
-  <dgm:styleLbl name="trAlignAcc1">
-    <dgm:fillClrLst meth="repeat">
-      <a:schemeClr val="lt1">
-        <a:alpha val="40000"/>
-      </a:schemeClr>
-    </dgm:fillClrLst>
-    <dgm:linClrLst meth="repeat">
-      <a:schemeClr val="accent1"/>
-    </dgm:linClrLst>
-    <dgm:effectClrLst/>
-    <dgm:txLinClrLst/>
-    <dgm:txFillClrLst meth="repeat">
-      <a:schemeClr val="dk1"/>
-    </dgm:txFillClrLst>
-    <dgm:txEffectClrLst/>
-  </dgm:styleLbl>
-  <dgm:styleLbl name="bgAcc1">
-    <dgm:fillClrLst meth="repeat">
-      <a:schemeClr val="lt1">
-        <a:alpha val="90000"/>
-      </a:schemeClr>
-    </dgm:fillClrLst>
-    <dgm:linClrLst meth="repeat">
-      <a:schemeClr val="accent1"/>
-    </dgm:linClrLst>
-    <dgm:effectClrLst/>
-    <dgm:txLinClrLst/>
-    <dgm:txFillClrLst meth="repeat">
-      <a:schemeClr val="dk1"/>
-    </dgm:txFillClrLst>
-    <dgm:txEffectClrLst/>
-  </dgm:styleLbl>
-  <dgm:styleLbl name="solidFgAcc1">
-    <dgm:fillClrLst meth="repeat">
-      <a:schemeClr val="lt1"/>
-    </dgm:fillClrLst>
-    <dgm:linClrLst meth="repeat">
-      <a:schemeClr val="accent1"/>
-    </dgm:linClrLst>
-    <dgm:effectClrLst/>
-    <dgm:txLinClrLst/>
-    <dgm:txFillClrLst meth="repeat">
-      <a:schemeClr val="dk1"/>
-    </dgm:txFillClrLst>
-    <dgm:txEffectClrLst/>
-  </dgm:styleLbl>
-  <dgm:styleLbl name="solidAlignAcc1">
-    <dgm:fillClrLst meth="repeat">
-      <a:schemeClr val="lt1"/>
-    </dgm:fillClrLst>
-    <dgm:linClrLst meth="repeat">
-      <a:schemeClr val="accent1"/>
-    </dgm:linClrLst>
-    <dgm:effectClrLst/>
-    <dgm:txLinClrLst/>
-    <dgm:txFillClrLst meth="repeat">
-      <a:schemeClr val="dk1"/>
-    </dgm:txFillClrLst>
-    <dgm:txEffectClrLst/>
-  </dgm:styleLbl>
-  <dgm:styleLbl name="solidBgAcc1">
-    <dgm:fillClrLst meth="repeat">
-      <a:schemeClr val="lt1"/>
-    </dgm:fillClrLst>
-    <dgm:linClrLst meth="repeat">
-      <a:schemeClr val="accent1"/>
-    </dgm:linClrLst>
-    <dgm:effectClrLst/>
-    <dgm:txLinClrLst/>
-    <dgm:txFillClrLst meth="repeat">
-      <a:schemeClr val="dk1"/>
-    </dgm:txFillClrLst>
-    <dgm:txEffectClrLst/>
-  </dgm:styleLbl>
-  <dgm:styleLbl name="fgAccFollowNode1">
-    <dgm:fillClrLst meth="repeat">
-      <a:schemeClr val="accent1">
-        <a:alpha val="90000"/>
-        <a:tint val="40000"/>
-      </a:schemeClr>
-    </dgm:fillClrLst>
-    <dgm:linClrLst meth="repeat">
-      <a:schemeClr val="accent1">
-        <a:alpha val="90000"/>
-        <a:tint val="40000"/>
-      </a:schemeClr>
-    </dgm:linClrLst>
-    <dgm:effectClrLst/>
-    <dgm:txLinClrLst/>
-    <dgm:txFillClrLst meth="repeat">
-      <a:schemeClr val="dk1"/>
-    </dgm:txFillClrLst>
-    <dgm:txEffectClrLst/>
-  </dgm:styleLbl>
-  <dgm:styleLbl name="alignAccFollowNode1">
-    <dgm:fillClrLst meth="repeat">
-      <a:schemeClr val="accent1">
-        <a:alpha val="90000"/>
-        <a:tint val="40000"/>
-      </a:schemeClr>
-    </dgm:fillClrLst>
-    <dgm:linClrLst meth="repeat">
-      <a:schemeClr val="accent1">
-        <a:alpha val="90000"/>
-        <a:tint val="40000"/>
-      </a:schemeClr>
-    </dgm:linClrLst>
-    <dgm:effectClrLst/>
-    <dgm:txLinClrLst/>
-    <dgm:txFillClrLst meth="repeat">
-      <a:schemeClr val="dk1"/>
-    </dgm:txFillClrLst>
-    <dgm:txEffectClrLst/>
-  </dgm:styleLbl>
-  <dgm:styleLbl name="bgAccFollowNode1">
-    <dgm:fillClrLst meth="repeat">
-      <a:schemeClr val="accent1">
-        <a:alpha val="90000"/>
-        <a:tint val="40000"/>
-      </a:schemeClr>
-    </dgm:fillClrLst>
-    <dgm:linClrLst meth="repeat">
-      <a:schemeClr val="accent1">
-        <a:alpha val="90000"/>
-        <a:tint val="40000"/>
-      </a:schemeClr>
-    </dgm:linClrLst>
-    <dgm:effectClrLst/>
-    <dgm:txLinClrLst/>
-    <dgm:txFillClrLst meth="repeat">
-      <a:schemeClr val="dk1"/>
-    </dgm:txFillClrLst>
-    <dgm:txEffectClrLst/>
-  </dgm:styleLbl>
-  <dgm:styleLbl name="fgAcc0">
-    <dgm:fillClrLst meth="repeat">
-      <a:schemeClr val="lt1">
-        <a:alpha val="90000"/>
-      </a:schemeClr>
-    </dgm:fillClrLst>
-    <dgm:linClrLst meth="repeat">
-      <a:schemeClr val="accent1"/>
-    </dgm:linClrLst>
-    <dgm:effectClrLst/>
-    <dgm:txLinClrLst/>
-    <dgm:txFillClrLst meth="repeat">
-      <a:schemeClr val="dk1"/>
-    </dgm:txFillClrLst>
-    <dgm:txEffectClrLst/>
-  </dgm:styleLbl>
-  <dgm:styleLbl name="fgAcc2">
-    <dgm:fillClrLst meth="repeat">
-      <a:schemeClr val="lt1">
-        <a:alpha val="90000"/>
-      </a:schemeClr>
-    </dgm:fillClrLst>
-    <dgm:linClrLst meth="repeat">
-      <a:schemeClr val="accent1"/>
-    </dgm:linClrLst>
-    <dgm:effectClrLst/>
-    <dgm:txLinClrLst/>
-    <dgm:txFillClrLst meth="repeat">
-      <a:schemeClr val="dk1"/>
-    </dgm:txFillClrLst>
-    <dgm:txEffectClrLst/>
-  </dgm:styleLbl>
-  <dgm:styleLbl name="fgAcc3">
-    <dgm:fillClrLst meth="repeat">
-      <a:schemeClr val="lt1">
-        <a:alpha val="90000"/>
-      </a:schemeClr>
-    </dgm:fillClrLst>
-    <dgm:linClrLst meth="repeat">
-      <a:schemeClr val="accent1"/>
-    </dgm:linClrLst>
-    <dgm:effectClrLst/>
-    <dgm:txLinClrLst/>
-    <dgm:txFillClrLst meth="repeat">
-      <a:schemeClr val="dk1"/>
-    </dgm:txFillClrLst>
-    <dgm:txEffectClrLst/>
-  </dgm:styleLbl>
-  <dgm:styleLbl name="fgAcc4">
-    <dgm:fillClrLst meth="repeat">
-      <a:schemeClr val="lt1">
-        <a:alpha val="90000"/>
-      </a:schemeClr>
-    </dgm:fillClrLst>
-    <dgm:linClrLst meth="repeat">
-      <a:schemeClr val="accent1"/>
-    </dgm:linClrLst>
-    <dgm:effectClrLst/>
-    <dgm:txLinClrLst/>
-    <dgm:txFillClrLst meth="repeat">
-      <a:schemeClr val="dk1"/>
-    </dgm:txFillClrLst>
-    <dgm:txEffectClrLst/>
-  </dgm:styleLbl>
-  <dgm:styleLbl name="bgShp">
-    <dgm:fillClrLst meth="repeat">
-      <a:schemeClr val="accent1">
-        <a:tint val="40000"/>
-      </a:schemeClr>
-    </dgm:fillClrLst>
-    <dgm:linClrLst meth="repeat">
-      <a:schemeClr val="accent1"/>
-    </dgm:linClrLst>
-    <dgm:effectClrLst/>
-    <dgm:txLinClrLst/>
-    <dgm:txFillClrLst meth="repeat">
-      <a:schemeClr val="dk1"/>
-    </dgm:txFillClrLst>
-    <dgm:txEffectClrLst/>
-  </dgm:styleLbl>
-  <dgm:styleLbl name="dkBgShp">
-    <dgm:fillClrLst meth="repeat">
-      <a:schemeClr val="accent1">
-        <a:shade val="80000"/>
-      </a:schemeClr>
-    </dgm:fillClrLst>
-    <dgm:linClrLst meth="repeat">
-      <a:schemeClr val="accent1"/>
-    </dgm:linClrLst>
-    <dgm:effectClrLst/>
-    <dgm:txLinClrLst/>
-    <dgm:txFillClrLst meth="repeat">
-      <a:schemeClr val="lt1"/>
-    </dgm:txFillClrLst>
-    <dgm:txEffectClrLst/>
-  </dgm:styleLbl>
-  <dgm:styleLbl name="trBgShp">
-    <dgm:fillClrLst meth="repeat">
-      <a:schemeClr val="accent1">
-        <a:tint val="50000"/>
-        <a:alpha val="40000"/>
-      </a:schemeClr>
-    </dgm:fillClrLst>
-    <dgm:linClrLst meth="repeat">
-      <a:schemeClr val="accent1"/>
-    </dgm:linClrLst>
-    <dgm:effectClrLst/>
-    <dgm:txLinClrLst/>
-    <dgm:txFillClrLst meth="repeat">
-      <a:schemeClr val="lt1"/>
-    </dgm:txFillClrLst>
-    <dgm:txEffectClrLst/>
-  </dgm:styleLbl>
-  <dgm:styleLbl name="fgShp">
-    <dgm:fillClrLst meth="repeat">
-      <a:schemeClr val="accent1">
-        <a:tint val="60000"/>
-      </a:schemeClr>
-    </dgm:fillClrLst>
-    <dgm:linClrLst meth="repeat">
-      <a:schemeClr val="lt1"/>
-    </dgm:linClrLst>
-    <dgm:effectClrLst/>
-    <dgm:txLinClrLst/>
-    <dgm:txFillClrLst meth="repeat">
-      <a:schemeClr val="dk1"/>
-    </dgm:txFillClrLst>
-    <dgm:txEffectClrLst/>
-  </dgm:styleLbl>
-  <dgm:styleLbl name="revTx">
-    <dgm:fillClrLst meth="repeat">
-      <a:schemeClr val="lt1">
-        <a:alpha val="0"/>
-      </a:schemeClr>
-    </dgm:fillClrLst>
-    <dgm:linClrLst meth="repeat">
-      <a:schemeClr val="dk1">
-        <a:alpha val="0"/>
-      </a:schemeClr>
-    </dgm:linClrLst>
-    <dgm:effectClrLst/>
-    <dgm:txLinClrLst/>
-    <dgm:txFillClrLst meth="repeat">
-      <a:schemeClr val="tx1"/>
-    </dgm:txFillClrLst>
-    <dgm:txEffectClrLst/>
-  </dgm:styleLbl>
-</dgm:colorsDef>
-</file>
-
-<file path=ppt/diagrams/data1.xml><?xml version="1.0" encoding="utf-8"?>
-<dgm:dataModel xmlns:dgm="http://schemas.openxmlformats.org/drawingml/2006/diagram" xmlns:a="http://schemas.openxmlformats.org/drawingml/2006/main">
-  <dgm:ptLst>
-    <dgm:pt modelId="{F75FBA5D-D1A2-43B7-B2E6-D00C67E07FAF}" type="doc">
-      <dgm:prSet loTypeId="urn:microsoft.com/office/officeart/2005/8/layout/chevronAccent+Icon" loCatId="officeonline" qsTypeId="urn:microsoft.com/office/officeart/2005/8/quickstyle/simple1" qsCatId="simple" csTypeId="urn:microsoft.com/office/officeart/2005/8/colors/accent1_2" csCatId="accent1" phldr="1"/>
-      <dgm:spPr/>
-    </dgm:pt>
-    <dgm:pt modelId="{843BFC27-E6F4-4939-869D-6A66FF0F3A5B}">
-      <dgm:prSet phldrT="[Text]" custT="1"/>
-      <dgm:spPr/>
-      <dgm:t>
-        <a:bodyPr/>
-        <a:lstStyle/>
-        <a:p>
-          <a:r>
-            <a:rPr lang="en-US" sz="1600" dirty="0"/>
-            <a:t>Public Preview </a:t>
-          </a:r>
-        </a:p>
-      </dgm:t>
-    </dgm:pt>
-    <dgm:pt modelId="{0D389BEF-AB95-4D81-A0CD-B6C16DEDB74F}" type="parTrans" cxnId="{29052CD3-B370-4575-A416-30975020ED5F}">
-      <dgm:prSet/>
-      <dgm:spPr/>
-      <dgm:t>
-        <a:bodyPr/>
-        <a:lstStyle/>
-        <a:p>
-          <a:endParaRPr lang="en-US" sz="1100"/>
-        </a:p>
-      </dgm:t>
-    </dgm:pt>
-    <dgm:pt modelId="{4B7B38E5-FC09-4034-A85B-88C66CC796A4}" type="sibTrans" cxnId="{29052CD3-B370-4575-A416-30975020ED5F}">
-      <dgm:prSet/>
-      <dgm:spPr/>
-      <dgm:t>
-        <a:bodyPr/>
-        <a:lstStyle/>
-        <a:p>
-          <a:endParaRPr lang="en-US" sz="1100"/>
-        </a:p>
-      </dgm:t>
-    </dgm:pt>
-    <dgm:pt modelId="{E3FC3241-CA43-4643-94B7-624F66A2330E}">
-      <dgm:prSet phldrT="[Text]" custT="1"/>
-      <dgm:spPr/>
-      <dgm:t>
-        <a:bodyPr/>
-        <a:lstStyle/>
-        <a:p>
-          <a:r>
-            <a:rPr lang="en-US" sz="1200" dirty="0"/>
-            <a:t>November</a:t>
-          </a:r>
-        </a:p>
-      </dgm:t>
-    </dgm:pt>
-    <dgm:pt modelId="{6140302C-277F-418E-9A76-FD2C40341AF1}" type="parTrans" cxnId="{4F47CA3E-6861-42E5-A194-D50E73269772}">
-      <dgm:prSet/>
-      <dgm:spPr/>
-      <dgm:t>
-        <a:bodyPr/>
-        <a:lstStyle/>
-        <a:p>
-          <a:endParaRPr lang="en-US" sz="1100"/>
-        </a:p>
-      </dgm:t>
-    </dgm:pt>
-    <dgm:pt modelId="{20CEC219-FB9C-4426-A142-68EBC2165CCE}" type="sibTrans" cxnId="{4F47CA3E-6861-42E5-A194-D50E73269772}">
-      <dgm:prSet/>
-      <dgm:spPr/>
-      <dgm:t>
-        <a:bodyPr/>
-        <a:lstStyle/>
-        <a:p>
-          <a:endParaRPr lang="en-US" sz="1100"/>
-        </a:p>
-      </dgm:t>
-    </dgm:pt>
-    <dgm:pt modelId="{B69928D8-8836-402F-9E0D-B723F4A9327D}">
-      <dgm:prSet phldrT="[Text]" custT="1"/>
-      <dgm:spPr/>
-      <dgm:t>
-        <a:bodyPr/>
-        <a:lstStyle/>
-        <a:p>
-          <a:r>
-            <a:rPr lang="en-US" sz="1600" dirty="0"/>
-            <a:t>GA</a:t>
-          </a:r>
-        </a:p>
-      </dgm:t>
-    </dgm:pt>
-    <dgm:pt modelId="{4536A575-4AA1-4DC4-935D-226AE6647FDF}" type="parTrans" cxnId="{FDF09B2B-C103-4D02-8F96-2CF41E85B1D2}">
-      <dgm:prSet/>
-      <dgm:spPr/>
-      <dgm:t>
-        <a:bodyPr/>
-        <a:lstStyle/>
-        <a:p>
-          <a:endParaRPr lang="en-US" sz="1100"/>
-        </a:p>
-      </dgm:t>
-    </dgm:pt>
-    <dgm:pt modelId="{7F177665-35BD-4CC2-8EB9-C81238D802DB}" type="sibTrans" cxnId="{FDF09B2B-C103-4D02-8F96-2CF41E85B1D2}">
-      <dgm:prSet/>
-      <dgm:spPr/>
-      <dgm:t>
-        <a:bodyPr/>
-        <a:lstStyle/>
-        <a:p>
-          <a:endParaRPr lang="en-US" sz="1100"/>
-        </a:p>
-      </dgm:t>
-    </dgm:pt>
-    <dgm:pt modelId="{C694935F-4B9E-4742-9372-006808342B40}">
-      <dgm:prSet phldrT="[Text]" custT="1"/>
-      <dgm:spPr/>
-      <dgm:t>
-        <a:bodyPr/>
-        <a:lstStyle/>
-        <a:p>
-          <a:r>
-            <a:rPr lang="en-US" sz="1200" dirty="0"/>
-            <a:t>Spring </a:t>
-          </a:r>
-          <a:r>
-            <a:rPr lang="en-US" sz="1200"/>
-            <a:t>‘17</a:t>
-          </a:r>
-          <a:endParaRPr lang="en-US" sz="1200" dirty="0"/>
-        </a:p>
-      </dgm:t>
-    </dgm:pt>
-    <dgm:pt modelId="{23956D32-4C5C-4871-86BA-5BFBD10A624C}" type="parTrans" cxnId="{FC094D53-83F2-490B-8BB1-EE9E63981CFF}">
-      <dgm:prSet/>
-      <dgm:spPr/>
-      <dgm:t>
-        <a:bodyPr/>
-        <a:lstStyle/>
-        <a:p>
-          <a:endParaRPr lang="en-US" sz="1100"/>
-        </a:p>
-      </dgm:t>
-    </dgm:pt>
-    <dgm:pt modelId="{EB79C0AD-BBC4-49AC-88B0-153638A76D83}" type="sibTrans" cxnId="{FC094D53-83F2-490B-8BB1-EE9E63981CFF}">
-      <dgm:prSet/>
-      <dgm:spPr/>
-      <dgm:t>
-        <a:bodyPr/>
-        <a:lstStyle/>
-        <a:p>
-          <a:endParaRPr lang="en-US" sz="1100"/>
-        </a:p>
-      </dgm:t>
-    </dgm:pt>
-    <dgm:pt modelId="{7FA54ABB-1800-4CB2-9509-944BB8543939}" type="pres">
-      <dgm:prSet presAssocID="{F75FBA5D-D1A2-43B7-B2E6-D00C67E07FAF}" presName="Name0" presStyleCnt="0">
-        <dgm:presLayoutVars>
-          <dgm:dir/>
-          <dgm:resizeHandles val="exact"/>
-        </dgm:presLayoutVars>
-      </dgm:prSet>
-      <dgm:spPr/>
-    </dgm:pt>
-    <dgm:pt modelId="{55A86D31-0FDF-4CAA-8B1A-F51FF121283C}" type="pres">
-      <dgm:prSet presAssocID="{843BFC27-E6F4-4939-869D-6A66FF0F3A5B}" presName="composite" presStyleCnt="0"/>
-      <dgm:spPr/>
-    </dgm:pt>
-    <dgm:pt modelId="{82863520-C3A7-413C-9641-DC1DB3089623}" type="pres">
-      <dgm:prSet presAssocID="{843BFC27-E6F4-4939-869D-6A66FF0F3A5B}" presName="bgChev" presStyleLbl="node1" presStyleIdx="0" presStyleCnt="2"/>
-      <dgm:spPr/>
-    </dgm:pt>
-    <dgm:pt modelId="{73D9BF0A-08E1-4B6C-A596-D28FF7F4D9F0}" type="pres">
-      <dgm:prSet presAssocID="{843BFC27-E6F4-4939-869D-6A66FF0F3A5B}" presName="txNode" presStyleLbl="fgAcc1" presStyleIdx="0" presStyleCnt="2">
-        <dgm:presLayoutVars>
-          <dgm:bulletEnabled val="1"/>
-        </dgm:presLayoutVars>
-      </dgm:prSet>
-      <dgm:spPr/>
-    </dgm:pt>
-    <dgm:pt modelId="{583B51F4-44E8-46B9-815C-4C2BC3B0FD4E}" type="pres">
-      <dgm:prSet presAssocID="{4B7B38E5-FC09-4034-A85B-88C66CC796A4}" presName="compositeSpace" presStyleCnt="0"/>
-      <dgm:spPr/>
-    </dgm:pt>
-    <dgm:pt modelId="{A2AFC7E8-C59B-4CDF-8EFA-34860061C926}" type="pres">
-      <dgm:prSet presAssocID="{B69928D8-8836-402F-9E0D-B723F4A9327D}" presName="composite" presStyleCnt="0"/>
-      <dgm:spPr/>
-    </dgm:pt>
-    <dgm:pt modelId="{21D41BB9-4704-46BA-87DA-8916E5225295}" type="pres">
-      <dgm:prSet presAssocID="{B69928D8-8836-402F-9E0D-B723F4A9327D}" presName="bgChev" presStyleLbl="node1" presStyleIdx="1" presStyleCnt="2"/>
-      <dgm:spPr/>
-    </dgm:pt>
-    <dgm:pt modelId="{A3291D0F-ED85-4213-8D73-F919AA852B54}" type="pres">
-      <dgm:prSet presAssocID="{B69928D8-8836-402F-9E0D-B723F4A9327D}" presName="txNode" presStyleLbl="fgAcc1" presStyleIdx="1" presStyleCnt="2">
-        <dgm:presLayoutVars>
-          <dgm:bulletEnabled val="1"/>
-        </dgm:presLayoutVars>
-      </dgm:prSet>
-      <dgm:spPr/>
-    </dgm:pt>
-  </dgm:ptLst>
-  <dgm:cxnLst>
-    <dgm:cxn modelId="{FDF09B2B-C103-4D02-8F96-2CF41E85B1D2}" srcId="{F75FBA5D-D1A2-43B7-B2E6-D00C67E07FAF}" destId="{B69928D8-8836-402F-9E0D-B723F4A9327D}" srcOrd="1" destOrd="0" parTransId="{4536A575-4AA1-4DC4-935D-226AE6647FDF}" sibTransId="{7F177665-35BD-4CC2-8EB9-C81238D802DB}"/>
-    <dgm:cxn modelId="{FC094D53-83F2-490B-8BB1-EE9E63981CFF}" srcId="{B69928D8-8836-402F-9E0D-B723F4A9327D}" destId="{C694935F-4B9E-4742-9372-006808342B40}" srcOrd="0" destOrd="0" parTransId="{23956D32-4C5C-4871-86BA-5BFBD10A624C}" sibTransId="{EB79C0AD-BBC4-49AC-88B0-153638A76D83}"/>
-    <dgm:cxn modelId="{FFDAF554-6044-4F8D-860F-128ED47C8A1C}" type="presOf" srcId="{843BFC27-E6F4-4939-869D-6A66FF0F3A5B}" destId="{73D9BF0A-08E1-4B6C-A596-D28FF7F4D9F0}" srcOrd="0" destOrd="0" presId="urn:microsoft.com/office/officeart/2005/8/layout/chevronAccent+Icon"/>
-    <dgm:cxn modelId="{29052CD3-B370-4575-A416-30975020ED5F}" srcId="{F75FBA5D-D1A2-43B7-B2E6-D00C67E07FAF}" destId="{843BFC27-E6F4-4939-869D-6A66FF0F3A5B}" srcOrd="0" destOrd="0" parTransId="{0D389BEF-AB95-4D81-A0CD-B6C16DEDB74F}" sibTransId="{4B7B38E5-FC09-4034-A85B-88C66CC796A4}"/>
-    <dgm:cxn modelId="{79987C50-FC7C-4419-B74B-797F1CEB360C}" type="presOf" srcId="{E3FC3241-CA43-4643-94B7-624F66A2330E}" destId="{73D9BF0A-08E1-4B6C-A596-D28FF7F4D9F0}" srcOrd="0" destOrd="1" presId="urn:microsoft.com/office/officeart/2005/8/layout/chevronAccent+Icon"/>
-    <dgm:cxn modelId="{D555D1B6-EFAA-4E5D-A2C2-4A7FBE41C897}" type="presOf" srcId="{B69928D8-8836-402F-9E0D-B723F4A9327D}" destId="{A3291D0F-ED85-4213-8D73-F919AA852B54}" srcOrd="0" destOrd="0" presId="urn:microsoft.com/office/officeart/2005/8/layout/chevronAccent+Icon"/>
-    <dgm:cxn modelId="{9CA0730E-F399-4DF8-95FD-2C07F785C928}" type="presOf" srcId="{C694935F-4B9E-4742-9372-006808342B40}" destId="{A3291D0F-ED85-4213-8D73-F919AA852B54}" srcOrd="0" destOrd="1" presId="urn:microsoft.com/office/officeart/2005/8/layout/chevronAccent+Icon"/>
-    <dgm:cxn modelId="{FC1ADA3E-1AEE-450F-BC4E-1FF1BD69931E}" type="presOf" srcId="{F75FBA5D-D1A2-43B7-B2E6-D00C67E07FAF}" destId="{7FA54ABB-1800-4CB2-9509-944BB8543939}" srcOrd="0" destOrd="0" presId="urn:microsoft.com/office/officeart/2005/8/layout/chevronAccent+Icon"/>
-    <dgm:cxn modelId="{4F47CA3E-6861-42E5-A194-D50E73269772}" srcId="{843BFC27-E6F4-4939-869D-6A66FF0F3A5B}" destId="{E3FC3241-CA43-4643-94B7-624F66A2330E}" srcOrd="0" destOrd="0" parTransId="{6140302C-277F-418E-9A76-FD2C40341AF1}" sibTransId="{20CEC219-FB9C-4426-A142-68EBC2165CCE}"/>
-    <dgm:cxn modelId="{18A242F8-BBFF-4172-BD4D-8B7D50F00F51}" type="presParOf" srcId="{7FA54ABB-1800-4CB2-9509-944BB8543939}" destId="{55A86D31-0FDF-4CAA-8B1A-F51FF121283C}" srcOrd="0" destOrd="0" presId="urn:microsoft.com/office/officeart/2005/8/layout/chevronAccent+Icon"/>
-    <dgm:cxn modelId="{968143DA-D8CF-4950-8C78-6155B5AB6E94}" type="presParOf" srcId="{55A86D31-0FDF-4CAA-8B1A-F51FF121283C}" destId="{82863520-C3A7-413C-9641-DC1DB3089623}" srcOrd="0" destOrd="0" presId="urn:microsoft.com/office/officeart/2005/8/layout/chevronAccent+Icon"/>
-    <dgm:cxn modelId="{3335BFA5-3A35-4441-9868-18D78CCA8762}" type="presParOf" srcId="{55A86D31-0FDF-4CAA-8B1A-F51FF121283C}" destId="{73D9BF0A-08E1-4B6C-A596-D28FF7F4D9F0}" srcOrd="1" destOrd="0" presId="urn:microsoft.com/office/officeart/2005/8/layout/chevronAccent+Icon"/>
-    <dgm:cxn modelId="{4116651D-D8FA-46B9-921F-ABC4D8EC35B7}" type="presParOf" srcId="{7FA54ABB-1800-4CB2-9509-944BB8543939}" destId="{583B51F4-44E8-46B9-815C-4C2BC3B0FD4E}" srcOrd="1" destOrd="0" presId="urn:microsoft.com/office/officeart/2005/8/layout/chevronAccent+Icon"/>
-    <dgm:cxn modelId="{AE40CAB7-B3AA-4DA7-8355-298713B74DBD}" type="presParOf" srcId="{7FA54ABB-1800-4CB2-9509-944BB8543939}" destId="{A2AFC7E8-C59B-4CDF-8EFA-34860061C926}" srcOrd="2" destOrd="0" presId="urn:microsoft.com/office/officeart/2005/8/layout/chevronAccent+Icon"/>
-    <dgm:cxn modelId="{85F9D34E-4A87-4DAD-AE2D-28DA445834C3}" type="presParOf" srcId="{A2AFC7E8-C59B-4CDF-8EFA-34860061C926}" destId="{21D41BB9-4704-46BA-87DA-8916E5225295}" srcOrd="0" destOrd="0" presId="urn:microsoft.com/office/officeart/2005/8/layout/chevronAccent+Icon"/>
-    <dgm:cxn modelId="{4D193F37-2CDE-4D8E-BFB5-DFA0F0C4DB61}" type="presParOf" srcId="{A2AFC7E8-C59B-4CDF-8EFA-34860061C926}" destId="{A3291D0F-ED85-4213-8D73-F919AA852B54}" srcOrd="1" destOrd="0" presId="urn:microsoft.com/office/officeart/2005/8/layout/chevronAccent+Icon"/>
-  </dgm:cxnLst>
-  <dgm:bg/>
-  <dgm:whole/>
-  <dgm:extLst>
-    <a:ext uri="http://schemas.microsoft.com/office/drawing/2008/diagram">
-      <dsp:dataModelExt xmlns:dsp="http://schemas.microsoft.com/office/drawing/2008/diagram" relId="rId7" minVer="http://schemas.openxmlformats.org/drawingml/2006/diagram"/>
-    </a:ext>
-  </dgm:extLst>
-</dgm:dataModel>
-</file>
-
-<file path=ppt/diagrams/drawing1.xml><?xml version="1.0" encoding="utf-8"?>
-<dsp:drawing xmlns:dgm="http://schemas.openxmlformats.org/drawingml/2006/diagram" xmlns:dsp="http://schemas.microsoft.com/office/drawing/2008/diagram" xmlns:a="http://schemas.openxmlformats.org/drawingml/2006/main">
-  <dsp:spTree>
-    <dsp:nvGrpSpPr>
-      <dsp:cNvPr id="0" name=""/>
-      <dsp:cNvGrpSpPr/>
-    </dsp:nvGrpSpPr>
-    <dsp:grpSpPr/>
-    <dsp:sp modelId="{82863520-C3A7-413C-9641-DC1DB3089623}">
-      <dsp:nvSpPr>
-        <dsp:cNvPr id="0" name=""/>
-        <dsp:cNvSpPr/>
-      </dsp:nvSpPr>
-      <dsp:spPr>
-        <a:xfrm>
-          <a:off x="2016" y="15245"/>
-          <a:ext cx="2095685" cy="808934"/>
-        </a:xfrm>
-        <a:prstGeom prst="chevron">
-          <a:avLst>
-            <a:gd name="adj" fmla="val 40000"/>
-          </a:avLst>
-        </a:prstGeom>
-        <a:solidFill>
-          <a:schemeClr val="accent1">
-            <a:hueOff val="0"/>
-            <a:satOff val="0"/>
-            <a:lumOff val="0"/>
-            <a:alphaOff val="0"/>
-          </a:schemeClr>
-        </a:solidFill>
-        <a:ln w="10795" cap="flat" cmpd="sng" algn="ctr">
-          <a:solidFill>
-            <a:schemeClr val="lt1">
-              <a:hueOff val="0"/>
-              <a:satOff val="0"/>
-              <a:lumOff val="0"/>
-              <a:alphaOff val="0"/>
-            </a:schemeClr>
-          </a:solidFill>
-          <a:prstDash val="solid"/>
-        </a:ln>
-        <a:effectLst/>
-      </dsp:spPr>
-      <dsp:style>
-        <a:lnRef idx="2">
-          <a:scrgbClr r="0" g="0" b="0"/>
-        </a:lnRef>
-        <a:fillRef idx="1">
-          <a:scrgbClr r="0" g="0" b="0"/>
-        </a:fillRef>
-        <a:effectRef idx="0">
-          <a:scrgbClr r="0" g="0" b="0"/>
-        </a:effectRef>
-        <a:fontRef idx="minor">
-          <a:schemeClr val="lt1"/>
-        </a:fontRef>
-      </dsp:style>
-    </dsp:sp>
-    <dsp:sp modelId="{73D9BF0A-08E1-4B6C-A596-D28FF7F4D9F0}">
-      <dsp:nvSpPr>
-        <dsp:cNvPr id="0" name=""/>
-        <dsp:cNvSpPr/>
-      </dsp:nvSpPr>
-      <dsp:spPr>
-        <a:xfrm>
-          <a:off x="560866" y="217478"/>
-          <a:ext cx="1769690" cy="808934"/>
-        </a:xfrm>
-        <a:prstGeom prst="roundRect">
-          <a:avLst>
-            <a:gd name="adj" fmla="val 10000"/>
-          </a:avLst>
-        </a:prstGeom>
-        <a:solidFill>
-          <a:schemeClr val="lt1">
-            <a:alpha val="90000"/>
-            <a:hueOff val="0"/>
-            <a:satOff val="0"/>
-            <a:lumOff val="0"/>
-            <a:alphaOff val="0"/>
-          </a:schemeClr>
-        </a:solidFill>
-        <a:ln w="10795" cap="flat" cmpd="sng" algn="ctr">
-          <a:solidFill>
-            <a:schemeClr val="accent1">
-              <a:hueOff val="0"/>
-              <a:satOff val="0"/>
-              <a:lumOff val="0"/>
-              <a:alphaOff val="0"/>
-            </a:schemeClr>
-          </a:solidFill>
-          <a:prstDash val="solid"/>
-        </a:ln>
-        <a:effectLst/>
-      </dsp:spPr>
-      <dsp:style>
-        <a:lnRef idx="2">
-          <a:scrgbClr r="0" g="0" b="0"/>
-        </a:lnRef>
-        <a:fillRef idx="1">
-          <a:scrgbClr r="0" g="0" b="0"/>
-        </a:fillRef>
-        <a:effectRef idx="0">
-          <a:scrgbClr r="0" g="0" b="0"/>
-        </a:effectRef>
-        <a:fontRef idx="minor"/>
-      </dsp:style>
-      <dsp:txBody>
-        <a:bodyPr spcFirstLastPara="0" vert="horz" wrap="square" lIns="113792" tIns="113792" rIns="113792" bIns="113792" numCol="1" spcCol="1270" anchor="t" anchorCtr="0">
-          <a:noAutofit/>
-        </a:bodyPr>
-        <a:lstStyle/>
-        <a:p>
-          <a:pPr marL="0" lvl="0" indent="0" algn="l" defTabSz="711200">
-            <a:lnSpc>
-              <a:spcPct val="90000"/>
-            </a:lnSpc>
-            <a:spcBef>
-              <a:spcPct val="0"/>
-            </a:spcBef>
-            <a:spcAft>
-              <a:spcPct val="35000"/>
-            </a:spcAft>
-            <a:buNone/>
-          </a:pPr>
-          <a:r>
-            <a:rPr lang="en-US" sz="1600" kern="1200" dirty="0"/>
-            <a:t>Public Preview </a:t>
-          </a:r>
-        </a:p>
-        <a:p>
-          <a:pPr marL="114300" lvl="1" indent="-114300" algn="l" defTabSz="533400">
-            <a:lnSpc>
-              <a:spcPct val="90000"/>
-            </a:lnSpc>
-            <a:spcBef>
-              <a:spcPct val="0"/>
-            </a:spcBef>
-            <a:spcAft>
-              <a:spcPct val="15000"/>
-            </a:spcAft>
-            <a:buChar char="•"/>
-          </a:pPr>
-          <a:r>
-            <a:rPr lang="en-US" sz="1200" kern="1200" dirty="0"/>
-            <a:t>November</a:t>
-          </a:r>
-        </a:p>
-      </dsp:txBody>
-      <dsp:txXfrm>
-        <a:off x="584559" y="241171"/>
-        <a:ext cx="1722304" cy="761548"/>
-      </dsp:txXfrm>
-    </dsp:sp>
-    <dsp:sp modelId="{21D41BB9-4704-46BA-87DA-8916E5225295}">
-      <dsp:nvSpPr>
-        <dsp:cNvPr id="0" name=""/>
-        <dsp:cNvSpPr/>
-      </dsp:nvSpPr>
-      <dsp:spPr>
-        <a:xfrm>
-          <a:off x="2395756" y="15245"/>
-          <a:ext cx="2095685" cy="808934"/>
-        </a:xfrm>
-        <a:prstGeom prst="chevron">
-          <a:avLst>
-            <a:gd name="adj" fmla="val 40000"/>
-          </a:avLst>
-        </a:prstGeom>
-        <a:solidFill>
-          <a:schemeClr val="accent1">
-            <a:hueOff val="0"/>
-            <a:satOff val="0"/>
-            <a:lumOff val="0"/>
-            <a:alphaOff val="0"/>
-          </a:schemeClr>
-        </a:solidFill>
-        <a:ln w="10795" cap="flat" cmpd="sng" algn="ctr">
-          <a:solidFill>
-            <a:schemeClr val="lt1">
-              <a:hueOff val="0"/>
-              <a:satOff val="0"/>
-              <a:lumOff val="0"/>
-              <a:alphaOff val="0"/>
-            </a:schemeClr>
-          </a:solidFill>
-          <a:prstDash val="solid"/>
-        </a:ln>
-        <a:effectLst/>
-      </dsp:spPr>
-      <dsp:style>
-        <a:lnRef idx="2">
-          <a:scrgbClr r="0" g="0" b="0"/>
-        </a:lnRef>
-        <a:fillRef idx="1">
-          <a:scrgbClr r="0" g="0" b="0"/>
-        </a:fillRef>
-        <a:effectRef idx="0">
-          <a:scrgbClr r="0" g="0" b="0"/>
-        </a:effectRef>
-        <a:fontRef idx="minor">
-          <a:schemeClr val="lt1"/>
-        </a:fontRef>
-      </dsp:style>
-    </dsp:sp>
-    <dsp:sp modelId="{A3291D0F-ED85-4213-8D73-F919AA852B54}">
-      <dsp:nvSpPr>
-        <dsp:cNvPr id="0" name=""/>
-        <dsp:cNvSpPr/>
-      </dsp:nvSpPr>
-      <dsp:spPr>
-        <a:xfrm>
-          <a:off x="2954605" y="217478"/>
-          <a:ext cx="1769690" cy="808934"/>
-        </a:xfrm>
-        <a:prstGeom prst="roundRect">
-          <a:avLst>
-            <a:gd name="adj" fmla="val 10000"/>
-          </a:avLst>
-        </a:prstGeom>
-        <a:solidFill>
-          <a:schemeClr val="lt1">
-            <a:alpha val="90000"/>
-            <a:hueOff val="0"/>
-            <a:satOff val="0"/>
-            <a:lumOff val="0"/>
-            <a:alphaOff val="0"/>
-          </a:schemeClr>
-        </a:solidFill>
-        <a:ln w="10795" cap="flat" cmpd="sng" algn="ctr">
-          <a:solidFill>
-            <a:schemeClr val="accent1">
-              <a:hueOff val="0"/>
-              <a:satOff val="0"/>
-              <a:lumOff val="0"/>
-              <a:alphaOff val="0"/>
-            </a:schemeClr>
-          </a:solidFill>
-          <a:prstDash val="solid"/>
-        </a:ln>
-        <a:effectLst/>
-      </dsp:spPr>
-      <dsp:style>
-        <a:lnRef idx="2">
-          <a:scrgbClr r="0" g="0" b="0"/>
-        </a:lnRef>
-        <a:fillRef idx="1">
-          <a:scrgbClr r="0" g="0" b="0"/>
-        </a:fillRef>
-        <a:effectRef idx="0">
-          <a:scrgbClr r="0" g="0" b="0"/>
-        </a:effectRef>
-        <a:fontRef idx="minor"/>
-      </dsp:style>
-      <dsp:txBody>
-        <a:bodyPr spcFirstLastPara="0" vert="horz" wrap="square" lIns="113792" tIns="113792" rIns="113792" bIns="113792" numCol="1" spcCol="1270" anchor="t" anchorCtr="0">
-          <a:noAutofit/>
-        </a:bodyPr>
-        <a:lstStyle/>
-        <a:p>
-          <a:pPr marL="0" lvl="0" indent="0" algn="l" defTabSz="711200">
-            <a:lnSpc>
-              <a:spcPct val="90000"/>
-            </a:lnSpc>
-            <a:spcBef>
-              <a:spcPct val="0"/>
-            </a:spcBef>
-            <a:spcAft>
-              <a:spcPct val="35000"/>
-            </a:spcAft>
-            <a:buNone/>
-          </a:pPr>
-          <a:r>
-            <a:rPr lang="en-US" sz="1600" kern="1200" dirty="0"/>
-            <a:t>GA</a:t>
-          </a:r>
-        </a:p>
-        <a:p>
-          <a:pPr marL="114300" lvl="1" indent="-114300" algn="l" defTabSz="533400">
-            <a:lnSpc>
-              <a:spcPct val="90000"/>
-            </a:lnSpc>
-            <a:spcBef>
-              <a:spcPct val="0"/>
-            </a:spcBef>
-            <a:spcAft>
-              <a:spcPct val="15000"/>
-            </a:spcAft>
-            <a:buChar char="•"/>
-          </a:pPr>
-          <a:r>
-            <a:rPr lang="en-US" sz="1200" kern="1200" dirty="0"/>
-            <a:t>Spring </a:t>
-          </a:r>
-          <a:r>
-            <a:rPr lang="en-US" sz="1200" kern="1200"/>
-            <a:t>‘17</a:t>
-          </a:r>
-          <a:endParaRPr lang="en-US" sz="1200" kern="1200" dirty="0"/>
-        </a:p>
-      </dsp:txBody>
-      <dsp:txXfrm>
-        <a:off x="2978298" y="241171"/>
-        <a:ext cx="1722304" cy="761548"/>
-      </dsp:txXfrm>
-    </dsp:sp>
-  </dsp:spTree>
-</dsp:drawing>
-</file>
-
-<file path=ppt/diagrams/layout1.xml><?xml version="1.0" encoding="utf-8"?>
-<dgm:layoutDef xmlns:dgm="http://schemas.openxmlformats.org/drawingml/2006/diagram" xmlns:a="http://schemas.openxmlformats.org/drawingml/2006/main" uniqueId="urn:microsoft.com/office/officeart/2005/8/layout/chevronAccent+Icon">
-  <dgm:title val="Chevron Accent Process"/>
-  <dgm:desc val="Use to show sequential steps in a task, process, or workflow, or to emphasize movement or direction. Works best with minimal Level 1 and Level 2 text."/>
-  <dgm:catLst>
-    <dgm:cat type="process" pri="9500"/>
-    <dgm:cat type="officeonline" pri="2000"/>
-  </dgm:catLst>
-  <dgm:sampData useDef="1">
-    <dgm:dataModel>
-      <dgm:ptLst/>
-      <dgm:bg/>
-      <dgm:whole/>
-    </dgm:dataModel>
-  </dgm:sampData>
-  <dgm:styleData>
-    <dgm:dataModel>
-      <dgm:ptLst>
-        <dgm:pt modelId="0" type="doc"/>
-        <dgm:pt modelId="1"/>
-        <dgm:pt modelId="2"/>
-      </dgm:ptLst>
-      <dgm:cxnLst>
-        <dgm:cxn modelId="4" srcId="0" destId="1" srcOrd="0" destOrd="0"/>
-        <dgm:cxn modelId="5" srcId="0" destId="2" srcOrd="1" destOrd="0"/>
-      </dgm:cxnLst>
-      <dgm:bg/>
-      <dgm:whole/>
-    </dgm:dataModel>
-  </dgm:styleData>
-  <dgm:clrData>
-    <dgm:dataModel>
-      <dgm:ptLst>
-        <dgm:pt modelId="0" type="doc"/>
-        <dgm:pt modelId="1"/>
-        <dgm:pt modelId="2"/>
-        <dgm:pt modelId="3"/>
-        <dgm:pt modelId="4"/>
-      </dgm:ptLst>
-      <dgm:cxnLst>
-        <dgm:cxn modelId="5" srcId="0" destId="1" srcOrd="0" destOrd="0"/>
-        <dgm:cxn modelId="6" srcId="0" destId="2" srcOrd="1" destOrd="0"/>
-        <dgm:cxn modelId="7" srcId="0" destId="3" srcOrd="2" destOrd="0"/>
-        <dgm:cxn modelId="8" srcId="0" destId="4" srcOrd="3" destOrd="0"/>
-      </dgm:cxnLst>
-      <dgm:bg/>
-      <dgm:whole/>
-    </dgm:dataModel>
-  </dgm:clrData>
-  <dgm:layoutNode name="Name0">
-    <dgm:varLst>
-      <dgm:dir/>
-      <dgm:resizeHandles val="exact"/>
-    </dgm:varLst>
-    <dgm:choose name="Name1">
-      <dgm:if name="Name2" func="var" arg="dir" op="equ" val="norm">
-        <dgm:alg type="lin"/>
-      </dgm:if>
-      <dgm:else name="Name3">
-        <dgm:alg type="lin">
-          <dgm:param type="linDir" val="fromR"/>
-        </dgm:alg>
-      </dgm:else>
-    </dgm:choose>
-    <dgm:shape xmlns:r="http://schemas.openxmlformats.org/officeDocument/2006/relationships" r:blip="">
-      <dgm:adjLst/>
-    </dgm:shape>
-    <dgm:presOf/>
-    <dgm:constrLst>
-      <dgm:constr type="w" for="ch" forName="composite" refType="w"/>
-      <dgm:constr type="primFontSz" for="des" forName="txNode" op="equ" val="65"/>
-      <dgm:constr type="w" for="ch" forName="compositeSpace" refType="w" refFor="ch" refForName="composite" fact="0.028"/>
-    </dgm:constrLst>
-    <dgm:ruleLst/>
-    <dgm:forEach name="Name4" axis="ch" ptType="node">
-      <dgm:layoutNode name="composite">
-        <dgm:alg type="composite"/>
-        <dgm:shape xmlns:r="http://schemas.openxmlformats.org/officeDocument/2006/relationships" r:blip="">
-          <dgm:adjLst/>
-        </dgm:shape>
-        <dgm:presOf/>
-        <dgm:choose name="Name5">
-          <dgm:if name="Name6" func="var" arg="dir" op="equ" val="norm">
-            <dgm:constrLst>
-              <dgm:constr type="l" for="ch" forName="bgChev"/>
-              <dgm:constr type="w" for="ch" forName="bgChev" refType="w" fact="0.9"/>
-              <dgm:constr type="t" for="ch" forName="bgChev"/>
-              <dgm:constr type="h" for="ch" forName="bgChev" refType="w" refFor="ch" refForName="bgChev" fact="0.386"/>
-              <dgm:constr type="l" for="ch" forName="txNode" refType="w" fact="0.24"/>
-              <dgm:constr type="w" for="ch" forName="txNode" refType="w" fact="0.76"/>
-              <dgm:constr type="t" for="ch" forName="txNode" refType="h" refFor="ch" refForName="bgChev" fact="0.25"/>
-              <dgm:constr type="h" for="ch" forName="txNode" refType="h" refFor="ch" refForName="bgChev"/>
-            </dgm:constrLst>
-          </dgm:if>
-          <dgm:else name="Name7">
-            <dgm:constrLst>
-              <dgm:constr type="l" for="ch" forName="bgChev" refType="w" fact="0.1"/>
-              <dgm:constr type="w" for="ch" forName="bgChev" refType="w" fact="0.9"/>
-              <dgm:constr type="t" for="ch" forName="bgChev"/>
-              <dgm:constr type="h" for="ch" forName="bgChev" refType="w" refFor="ch" refForName="bgChev" fact="0.386"/>
-              <dgm:constr type="l" for="ch" forName="txNode"/>
-              <dgm:constr type="w" for="ch" forName="txNode" refType="w" fact="0.76"/>
-              <dgm:constr type="t" for="ch" forName="txNode" refType="h" refFor="ch" refForName="bgChev" fact="0.25"/>
-              <dgm:constr type="h" for="ch" forName="txNode" refType="h" refFor="ch" refForName="bgChev"/>
-            </dgm:constrLst>
-          </dgm:else>
-        </dgm:choose>
-        <dgm:ruleLst/>
-        <dgm:layoutNode name="bgChev" styleLbl="node1">
-          <dgm:alg type="sp"/>
-          <dgm:choose name="Name8">
-            <dgm:if name="Name9" func="var" arg="dir" op="equ" val="norm">
-              <dgm:shape xmlns:r="http://schemas.openxmlformats.org/officeDocument/2006/relationships" type="chevron" r:blip="">
-                <dgm:adjLst>
-                  <dgm:adj idx="1" val="0.4"/>
-                </dgm:adjLst>
-              </dgm:shape>
-            </dgm:if>
-            <dgm:else name="Name10">
-              <dgm:shape xmlns:r="http://schemas.openxmlformats.org/officeDocument/2006/relationships" rot="180" type="chevron" r:blip="">
-                <dgm:adjLst>
-                  <dgm:adj idx="1" val="0.4"/>
-                </dgm:adjLst>
-              </dgm:shape>
-            </dgm:else>
-          </dgm:choose>
-          <dgm:presOf/>
-          <dgm:constrLst/>
-        </dgm:layoutNode>
-        <dgm:layoutNode name="txNode" styleLbl="fgAcc1">
-          <dgm:varLst>
-            <dgm:bulletEnabled val="1"/>
-          </dgm:varLst>
-          <dgm:alg type="tx"/>
-          <dgm:shape xmlns:r="http://schemas.openxmlformats.org/officeDocument/2006/relationships" type="roundRect" r:blip="">
-            <dgm:adjLst>
-              <dgm:adj idx="1" val="0.1"/>
-            </dgm:adjLst>
-          </dgm:shape>
-          <dgm:presOf axis="desOrSelf" ptType="node"/>
-          <dgm:ruleLst>
-            <dgm:rule type="primFontSz" val="5" fact="NaN" max="NaN"/>
-          </dgm:ruleLst>
-        </dgm:layoutNode>
-      </dgm:layoutNode>
-      <dgm:forEach name="Name11" axis="followSib" ptType="sibTrans" cnt="1">
-        <dgm:layoutNode name="compositeSpace">
-          <dgm:alg type="sp"/>
-          <dgm:shape xmlns:r="http://schemas.openxmlformats.org/officeDocument/2006/relationships" r:blip="">
-            <dgm:adjLst/>
-          </dgm:shape>
-          <dgm:presOf axis="self"/>
-          <dgm:constrLst/>
-          <dgm:ruleLst/>
-        </dgm:layoutNode>
-      </dgm:forEach>
-    </dgm:forEach>
-  </dgm:layoutNode>
-</dgm:layoutDef>
-</file>
-
-<file path=ppt/diagrams/quickStyle1.xml><?xml version="1.0" encoding="utf-8"?>
-<dgm:styleDef xmlns:dgm="http://schemas.openxmlformats.org/drawingml/2006/diagram" xmlns:a="http://schemas.openxmlformats.org/drawingml/2006/main" uniqueId="urn:microsoft.com/office/officeart/2005/8/quickstyle/simple1">
-  <dgm:title val=""/>
-  <dgm:desc val=""/>
-  <dgm:catLst>
-    <dgm:cat type="simple" pri="10100"/>
-  </dgm:catLst>
-  <dgm:scene3d>
-    <a:camera prst="orthographicFront"/>
-    <a:lightRig rig="threePt" dir="t"/>
-  </dgm:scene3d>
-  <dgm:styleLbl name="node0">
-    <dgm:scene3d>
-      <a:camera prst="orthographicFront"/>
-      <a:lightRig rig="threePt" dir="t"/>
-    </dgm:scene3d>
-    <dgm:sp3d/>
-    <dgm:txPr/>
-    <dgm:style>
-      <a:lnRef idx="2">
-        <a:scrgbClr r="0" g="0" b="0"/>
-      </a:lnRef>
-      <a:fillRef idx="1">
-        <a:scrgbClr r="0" g="0" b="0"/>
-      </a:fillRef>
-      <a:effectRef idx="0">
-        <a:scrgbClr r="0" g="0" b="0"/>
-      </a:effectRef>
-      <a:fontRef idx="minor">
-        <a:schemeClr val="lt1"/>
-      </a:fontRef>
-    </dgm:style>
-  </dgm:styleLbl>
-  <dgm:styleLbl name="lnNode1">
-    <dgm:scene3d>
-      <a:camera prst="orthographicFront"/>
-      <a:lightRig rig="threePt" dir="t"/>
-    </dgm:scene3d>
-    <dgm:sp3d/>
-    <dgm:txPr/>
-    <dgm:style>
-      <a:lnRef idx="2">
-        <a:scrgbClr r="0" g="0" b="0"/>
-      </a:lnRef>
-      <a:fillRef idx="1">
-        <a:scrgbClr r="0" g="0" b="0"/>
-      </a:fillRef>
-      <a:effectRef idx="0">
-        <a:scrgbClr r="0" g="0" b="0"/>
-      </a:effectRef>
-      <a:fontRef idx="minor">
-        <a:schemeClr val="lt1"/>
-      </a:fontRef>
-    </dgm:style>
-  </dgm:styleLbl>
-  <dgm:styleLbl name="vennNode1">
-    <dgm:scene3d>
-      <a:camera prst="orthographicFront"/>
-      <a:lightRig rig="threePt" dir="t"/>
-    </dgm:scene3d>
-    <dgm:sp3d/>
-    <dgm:txPr/>
-    <dgm:style>
-      <a:lnRef idx="2">
-        <a:scrgbClr r="0" g="0" b="0"/>
-      </a:lnRef>
-      <a:fillRef idx="1">
-        <a:scrgbClr r="0" g="0" b="0"/>
-      </a:fillRef>
-      <a:effectRef idx="0">
-        <a:scrgbClr r="0" g="0" b="0"/>
-      </a:effectRef>
-      <a:fontRef idx="minor">
-        <a:schemeClr val="tx1"/>
-      </a:fontRef>
-    </dgm:style>
-  </dgm:styleLbl>
-  <dgm:styleLbl name="alignNode1">
-    <dgm:scene3d>
-      <a:camera prst="orthographicFront"/>
-      <a:lightRig rig="threePt" dir="t"/>
-    </dgm:scene3d>
-    <dgm:sp3d/>
-    <dgm:txPr/>
-    <dgm:style>
-      <a:lnRef idx="2">
-        <a:scrgbClr r="0" g="0" b="0"/>
-      </a:lnRef>
-      <a:fillRef idx="1">
-        <a:scrgbClr r="0" g="0" b="0"/>
-      </a:fillRef>
-      <a:effectRef idx="0">
-        <a:scrgbClr r="0" g="0" b="0"/>
-      </a:effectRef>
-      <a:fontRef idx="minor">
-        <a:schemeClr val="lt1"/>
-      </a:fontRef>
-    </dgm:style>
-  </dgm:styleLbl>
-  <dgm:styleLbl name="node1">
-    <dgm:scene3d>
-      <a:camera prst="orthographicFront"/>
-      <a:lightRig rig="threePt" dir="t"/>
-    </dgm:scene3d>
-    <dgm:sp3d/>
-    <dgm:txPr/>
-    <dgm:style>
-      <a:lnRef idx="2">
-        <a:scrgbClr r="0" g="0" b="0"/>
-      </a:lnRef>
-      <a:fillRef idx="1">
-        <a:scrgbClr r="0" g="0" b="0"/>
-      </a:fillRef>
-      <a:effectRef idx="0">
-        <a:scrgbClr r="0" g="0" b="0"/>
-      </a:effectRef>
-      <a:fontRef idx="minor">
-        <a:schemeClr val="lt1"/>
-      </a:fontRef>
-    </dgm:style>
-  </dgm:styleLbl>
-  <dgm:styleLbl name="node2">
-    <dgm:scene3d>
-      <a:camera prst="orthographicFront"/>
-      <a:lightRig rig="threePt" dir="t"/>
-    </dgm:scene3d>
-    <dgm:sp3d/>
-    <dgm:txPr/>
-    <dgm:style>
-      <a:lnRef idx="2">
-        <a:scrgbClr r="0" g="0" b="0"/>
-      </a:lnRef>
-      <a:fillRef idx="1">
-        <a:scrgbClr r="0" g="0" b="0"/>
-      </a:fillRef>
-      <a:effectRef idx="0">
-        <a:scrgbClr r="0" g="0" b="0"/>
-      </a:effectRef>
-      <a:fontRef idx="minor">
-        <a:schemeClr val="lt1"/>
-      </a:fontRef>
-    </dgm:style>
-  </dgm:styleLbl>
-  <dgm:styleLbl name="node3">
-    <dgm:scene3d>
-      <a:camera prst="orthographicFront"/>
-      <a:lightRig rig="threePt" dir="t"/>
-    </dgm:scene3d>
-    <dgm:sp3d/>
-    <dgm:txPr/>
-    <dgm:style>
-      <a:lnRef idx="2">
-        <a:scrgbClr r="0" g="0" b="0"/>
-      </a:lnRef>
-      <a:fillRef idx="1">
-        <a:scrgbClr r="0" g="0" b="0"/>
-      </a:fillRef>
-      <a:effectRef idx="0">
-        <a:scrgbClr r="0" g="0" b="0"/>
-      </a:effectRef>
-      <a:fontRef idx="minor">
-        <a:schemeClr val="lt1"/>
-      </a:fontRef>
-    </dgm:style>
-  </dgm:styleLbl>
-  <dgm:styleLbl name="node4">
-    <dgm:scene3d>
-      <a:camera prst="orthographicFront"/>
-      <a:lightRig rig="threePt" dir="t"/>
-    </dgm:scene3d>
-    <dgm:sp3d/>
-    <dgm:txPr/>
-    <dgm:style>
-      <a:lnRef idx="2">
-        <a:scrgbClr r="0" g="0" b="0"/>
-      </a:lnRef>
-      <a:fillRef idx="1">
-        <a:scrgbClr r="0" g="0" b="0"/>
-      </a:fillRef>
-      <a:effectRef idx="0">
-        <a:scrgbClr r="0" g="0" b="0"/>
-      </a:effectRef>
-      <a:fontRef idx="minor">
-        <a:schemeClr val="lt1"/>
-      </a:fontRef>
-    </dgm:style>
-  </dgm:styleLbl>
-  <dgm:styleLbl name="fgImgPlace1">
-    <dgm:scene3d>
-      <a:camera prst="orthographicFront"/>
-      <a:lightRig rig="threePt" dir="t"/>
-    </dgm:scene3d>
-    <dgm:sp3d/>
-    <dgm:txPr/>
-    <dgm:style>
-      <a:lnRef idx="2">
-        <a:scrgbClr r="0" g="0" b="0"/>
-      </a:lnRef>
-      <a:fillRef idx="1">
-        <a:scrgbClr r="0" g="0" b="0"/>
-      </a:fillRef>
-      <a:effectRef idx="0">
-        <a:scrgbClr r="0" g="0" b="0"/>
-      </a:effectRef>
-      <a:fontRef idx="minor"/>
-    </dgm:style>
-  </dgm:styleLbl>
-  <dgm:styleLbl name="alignImgPlace1">
-    <dgm:scene3d>
-      <a:camera prst="orthographicFront"/>
-      <a:lightRig rig="threePt" dir="t"/>
-    </dgm:scene3d>
-    <dgm:sp3d/>
-    <dgm:txPr/>
-    <dgm:style>
-      <a:lnRef idx="2">
-        <a:scrgbClr r="0" g="0" b="0"/>
-      </a:lnRef>
-      <a:fillRef idx="1">
-        <a:scrgbClr r="0" g="0" b="0"/>
-      </a:fillRef>
-      <a:effectRef idx="0">
-        <a:scrgbClr r="0" g="0" b="0"/>
-      </a:effectRef>
-      <a:fontRef idx="minor"/>
-    </dgm:style>
-  </dgm:styleLbl>
-  <dgm:styleLbl name="bgImgPlace1">
-    <dgm:scene3d>
-      <a:camera prst="orthographicFront"/>
-      <a:lightRig rig="threePt" dir="t"/>
-    </dgm:scene3d>
-    <dgm:sp3d/>
-    <dgm:txPr/>
-    <dgm:style>
-      <a:lnRef idx="2">
-        <a:scrgbClr r="0" g="0" b="0"/>
-      </a:lnRef>
-      <a:fillRef idx="1">
-        <a:scrgbClr r="0" g="0" b="0"/>
-      </a:fillRef>
-      <a:effectRef idx="0">
-        <a:scrgbClr r="0" g="0" b="0"/>
-      </a:effectRef>
-      <a:fontRef idx="minor"/>
-    </dgm:style>
-  </dgm:styleLbl>
-  <dgm:styleLbl name="sibTrans2D1">
-    <dgm:scene3d>
-      <a:camera prst="orthographicFront"/>
-      <a:lightRig rig="threePt" dir="t"/>
-    </dgm:scene3d>
-    <dgm:sp3d/>
-    <dgm:txPr/>
-    <dgm:style>
-      <a:lnRef idx="0">
-        <a:scrgbClr r="0" g="0" b="0"/>
-      </a:lnRef>
-      <a:fillRef idx="1">
-        <a:scrgbClr r="0" g="0" b="0"/>
-      </a:fillRef>
-      <a:effectRef idx="0">
-        <a:scrgbClr r="0" g="0" b="0"/>
-      </a:effectRef>
-      <a:fontRef idx="minor">
-        <a:schemeClr val="lt1"/>
-      </a:fontRef>
-    </dgm:style>
-  </dgm:styleLbl>
-  <dgm:styleLbl name="fgSibTrans2D1">
-    <dgm:scene3d>
-      <a:camera prst="orthographicFront"/>
-      <a:lightRig rig="threePt" dir="t"/>
-    </dgm:scene3d>
-    <dgm:sp3d/>
-    <dgm:txPr/>
-    <dgm:style>
-      <a:lnRef idx="0">
-        <a:scrgbClr r="0" g="0" b="0"/>
-      </a:lnRef>
-      <a:fillRef idx="1">
-        <a:scrgbClr r="0" g="0" b="0"/>
-      </a:fillRef>
-      <a:effectRef idx="0">
-        <a:scrgbClr r="0" g="0" b="0"/>
-      </a:effectRef>
-      <a:fontRef idx="minor">
-        <a:schemeClr val="lt1"/>
-      </a:fontRef>
-    </dgm:style>
-  </dgm:styleLbl>
-  <dgm:styleLbl name="bgSibTrans2D1">
-    <dgm:scene3d>
-      <a:camera prst="orthographicFront"/>
-      <a:lightRig rig="threePt" dir="t"/>
-    </dgm:scene3d>
-    <dgm:sp3d/>
-    <dgm:txPr/>
-    <dgm:style>
-      <a:lnRef idx="0">
-        <a:scrgbClr r="0" g="0" b="0"/>
-      </a:lnRef>
-      <a:fillRef idx="1">
-        <a:scrgbClr r="0" g="0" b="0"/>
-      </a:fillRef>
-      <a:effectRef idx="0">
-        <a:scrgbClr r="0" g="0" b="0"/>
-      </a:effectRef>
-      <a:fontRef idx="minor">
-        <a:schemeClr val="lt1"/>
-      </a:fontRef>
-    </dgm:style>
-  </dgm:styleLbl>
-  <dgm:styleLbl name="sibTrans1D1">
-    <dgm:scene3d>
-      <a:camera prst="orthographicFront"/>
-      <a:lightRig rig="threePt" dir="t"/>
-    </dgm:scene3d>
-    <dgm:sp3d/>
-    <dgm:txPr/>
-    <dgm:style>
-      <a:lnRef idx="1">
-        <a:scrgbClr r="0" g="0" b="0"/>
-      </a:lnRef>
-      <a:fillRef idx="0">
-        <a:scrgbClr r="0" g="0" b="0"/>
-      </a:fillRef>
-      <a:effectRef idx="0">
-        <a:scrgbClr r="0" g="0" b="0"/>
-      </a:effectRef>
-      <a:fontRef idx="minor"/>
-    </dgm:style>
-  </dgm:styleLbl>
-  <dgm:styleLbl name="callout">
-    <dgm:scene3d>
-      <a:camera prst="orthographicFront"/>
-      <a:lightRig rig="threePt" dir="t"/>
-    </dgm:scene3d>
-    <dgm:sp3d/>
-    <dgm:txPr/>
-    <dgm:style>
-      <a:lnRef idx="2">
-        <a:scrgbClr r="0" g="0" b="0"/>
-      </a:lnRef>
-      <a:fillRef idx="1">
-        <a:scrgbClr r="0" g="0" b="0"/>
-      </a:fillRef>
-      <a:effectRef idx="0">
-        <a:scrgbClr r="0" g="0" b="0"/>
-      </a:effectRef>
-      <a:fontRef idx="minor"/>
-    </dgm:style>
-  </dgm:styleLbl>
-  <dgm:styleLbl name="asst0">
-    <dgm:scene3d>
-      <a:camera prst="orthographicFront"/>
-      <a:lightRig rig="threePt" dir="t"/>
-    </dgm:scene3d>
-    <dgm:sp3d/>
-    <dgm:txPr/>
-    <dgm:style>
-      <a:lnRef idx="2">
-        <a:scrgbClr r="0" g="0" b="0"/>
-      </a:lnRef>
-      <a:fillRef idx="1">
-        <a:scrgbClr r="0" g="0" b="0"/>
-      </a:fillRef>
-      <a:effectRef idx="0">
-        <a:scrgbClr r="0" g="0" b="0"/>
-      </a:effectRef>
-      <a:fontRef idx="minor">
-        <a:schemeClr val="lt1"/>
-      </a:fontRef>
-    </dgm:style>
-  </dgm:styleLbl>
-  <dgm:styleLbl name="asst1">
-    <dgm:scene3d>
-      <a:camera prst="orthographicFront"/>
-      <a:lightRig rig="threePt" dir="t"/>
-    </dgm:scene3d>
-    <dgm:sp3d/>
-    <dgm:txPr/>
-    <dgm:style>
-      <a:lnRef idx="2">
-        <a:scrgbClr r="0" g="0" b="0"/>
-      </a:lnRef>
-      <a:fillRef idx="1">
-        <a:scrgbClr r="0" g="0" b="0"/>
-      </a:fillRef>
-      <a:effectRef idx="0">
-        <a:scrgbClr r="0" g="0" b="0"/>
-      </a:effectRef>
-      <a:fontRef idx="minor">
-        <a:schemeClr val="lt1"/>
-      </a:fontRef>
-    </dgm:style>
-  </dgm:styleLbl>
-  <dgm:styleLbl name="asst2">
-    <dgm:scene3d>
-      <a:camera prst="orthographicFront"/>
-      <a:lightRig rig="threePt" dir="t"/>
-    </dgm:scene3d>
-    <dgm:sp3d/>
-    <dgm:txPr/>
-    <dgm:style>
-      <a:lnRef idx="2">
-        <a:scrgbClr r="0" g="0" b="0"/>
-      </a:lnRef>
-      <a:fillRef idx="1">
-        <a:scrgbClr r="0" g="0" b="0"/>
-      </a:fillRef>
-      <a:effectRef idx="0">
-        <a:scrgbClr r="0" g="0" b="0"/>
-      </a:effectRef>
-      <a:fontRef idx="minor">
-        <a:schemeClr val="lt1"/>
-      </a:fontRef>
-    </dgm:style>
-  </dgm:styleLbl>
-  <dgm:styleLbl name="asst3">
-    <dgm:scene3d>
-      <a:camera prst="orthographicFront"/>
-      <a:lightRig rig="threePt" dir="t"/>
-    </dgm:scene3d>
-    <dgm:sp3d/>
-    <dgm:txPr/>
-    <dgm:style>
-      <a:lnRef idx="2">
-        <a:scrgbClr r="0" g="0" b="0"/>
-      </a:lnRef>
-      <a:fillRef idx="1">
-        <a:scrgbClr r="0" g="0" b="0"/>
-      </a:fillRef>
-      <a:effectRef idx="0">
-        <a:scrgbClr r="0" g="0" b="0"/>
-      </a:effectRef>
-      <a:fontRef idx="minor">
-        <a:schemeClr val="lt1"/>
-      </a:fontRef>
-    </dgm:style>
-  </dgm:styleLbl>
-  <dgm:styleLbl name="asst4">
-    <dgm:scene3d>
-      <a:camera prst="orthographicFront"/>
-      <a:lightRig rig="threePt" dir="t"/>
-    </dgm:scene3d>
-    <dgm:sp3d/>
-    <dgm:txPr/>
-    <dgm:style>
-      <a:lnRef idx="2">
-        <a:scrgbClr r="0" g="0" b="0"/>
-      </a:lnRef>
-      <a:fillRef idx="1">
-        <a:scrgbClr r="0" g="0" b="0"/>
-      </a:fillRef>
-      <a:effectRef idx="0">
-        <a:scrgbClr r="0" g="0" b="0"/>
-      </a:effectRef>
-      <a:fontRef idx="minor">
-        <a:schemeClr val="lt1"/>
-      </a:fontRef>
-    </dgm:style>
-  </dgm:styleLbl>
-  <dgm:styleLbl name="parChTrans2D1">
-    <dgm:scene3d>
-      <a:camera prst="orthographicFront"/>
-      <a:lightRig rig="threePt" dir="t"/>
-    </dgm:scene3d>
-    <dgm:sp3d/>
-    <dgm:txPr/>
-    <dgm:style>
-      <a:lnRef idx="2">
-        <a:scrgbClr r="0" g="0" b="0"/>
-      </a:lnRef>
-      <a:fillRef idx="1">
-        <a:scrgbClr r="0" g="0" b="0"/>
-      </a:fillRef>
-      <a:effectRef idx="0">
-        <a:scrgbClr r="0" g="0" b="0"/>
-      </a:effectRef>
-      <a:fontRef idx="minor">
-        <a:schemeClr val="lt1"/>
-      </a:fontRef>
-    </dgm:style>
-  </dgm:styleLbl>
-  <dgm:styleLbl name="parChTrans2D2">
-    <dgm:scene3d>
-      <a:camera prst="orthographicFront"/>
-      <a:lightRig rig="threePt" dir="t"/>
-    </dgm:scene3d>
-    <dgm:sp3d/>
-    <dgm:txPr/>
-    <dgm:style>
-      <a:lnRef idx="2">
-        <a:scrgbClr r="0" g="0" b="0"/>
-      </a:lnRef>
-      <a:fillRef idx="1">
-        <a:scrgbClr r="0" g="0" b="0"/>
-      </a:fillRef>
-      <a:effectRef idx="0">
-        <a:scrgbClr r="0" g="0" b="0"/>
-      </a:effectRef>
-      <a:fontRef idx="minor">
-        <a:schemeClr val="lt1"/>
-      </a:fontRef>
-    </dgm:style>
-  </dgm:styleLbl>
-  <dgm:styleLbl name="parChTrans2D3">
-    <dgm:scene3d>
-      <a:camera prst="orthographicFront"/>
-      <a:lightRig rig="threePt" dir="t"/>
-    </dgm:scene3d>
-    <dgm:sp3d/>
-    <dgm:txPr/>
-    <dgm:style>
-      <a:lnRef idx="2">
-        <a:scrgbClr r="0" g="0" b="0"/>
-      </a:lnRef>
-      <a:fillRef idx="1">
-        <a:scrgbClr r="0" g="0" b="0"/>
-      </a:fillRef>
-      <a:effectRef idx="0">
-        <a:scrgbClr r="0" g="0" b="0"/>
-      </a:effectRef>
-      <a:fontRef idx="minor">
-        <a:schemeClr val="lt1"/>
-      </a:fontRef>
-    </dgm:style>
-  </dgm:styleLbl>
-  <dgm:styleLbl name="parChTrans2D4">
-    <dgm:scene3d>
-      <a:camera prst="orthographicFront"/>
-      <a:lightRig rig="threePt" dir="t"/>
-    </dgm:scene3d>
-    <dgm:sp3d/>
-    <dgm:txPr/>
-    <dgm:style>
-      <a:lnRef idx="2">
-        <a:scrgbClr r="0" g="0" b="0"/>
-      </a:lnRef>
-      <a:fillRef idx="1">
-        <a:scrgbClr r="0" g="0" b="0"/>
-      </a:fillRef>
-      <a:effectRef idx="0">
-        <a:scrgbClr r="0" g="0" b="0"/>
-      </a:effectRef>
-      <a:fontRef idx="minor">
-        <a:schemeClr val="lt1"/>
-      </a:fontRef>
-    </dgm:style>
-  </dgm:styleLbl>
-  <dgm:styleLbl name="parChTrans1D1">
-    <dgm:scene3d>
-      <a:camera prst="orthographicFront"/>
-      <a:lightRig rig="threePt" dir="t"/>
-    </dgm:scene3d>
-    <dgm:sp3d/>
-    <dgm:txPr/>
-    <dgm:style>
-      <a:lnRef idx="2">
-        <a:scrgbClr r="0" g="0" b="0"/>
-      </a:lnRef>
-      <a:fillRef idx="0">
-        <a:scrgbClr r="0" g="0" b="0"/>
-      </a:fillRef>
-      <a:effectRef idx="0">
-        <a:scrgbClr r="0" g="0" b="0"/>
-      </a:effectRef>
-      <a:fontRef idx="minor"/>
-    </dgm:style>
-  </dgm:styleLbl>
-  <dgm:styleLbl name="parChTrans1D2">
-    <dgm:scene3d>
-      <a:camera prst="orthographicFront"/>
-      <a:lightRig rig="threePt" dir="t"/>
-    </dgm:scene3d>
-    <dgm:sp3d/>
-    <dgm:txPr/>
-    <dgm:style>
-      <a:lnRef idx="2">
-        <a:scrgbClr r="0" g="0" b="0"/>
-      </a:lnRef>
-      <a:fillRef idx="0">
-        <a:scrgbClr r="0" g="0" b="0"/>
-      </a:fillRef>
-      <a:effectRef idx="0">
-        <a:scrgbClr r="0" g="0" b="0"/>
-      </a:effectRef>
-      <a:fontRef idx="minor"/>
-    </dgm:style>
-  </dgm:styleLbl>
-  <dgm:styleLbl name="parChTrans1D3">
-    <dgm:scene3d>
-      <a:camera prst="orthographicFront"/>
-      <a:lightRig rig="threePt" dir="t"/>
-    </dgm:scene3d>
-    <dgm:sp3d/>
-    <dgm:txPr/>
-    <dgm:style>
-      <a:lnRef idx="2">
-        <a:scrgbClr r="0" g="0" b="0"/>
-      </a:lnRef>
-      <a:fillRef idx="0">
-        <a:scrgbClr r="0" g="0" b="0"/>
-      </a:fillRef>
-      <a:effectRef idx="0">
-        <a:scrgbClr r="0" g="0" b="0"/>
-      </a:effectRef>
-      <a:fontRef idx="minor"/>
-    </dgm:style>
-  </dgm:styleLbl>
-  <dgm:styleLbl name="parChTrans1D4">
-    <dgm:scene3d>
-      <a:camera prst="orthographicFront"/>
-      <a:lightRig rig="threePt" dir="t"/>
-    </dgm:scene3d>
-    <dgm:sp3d/>
-    <dgm:txPr/>
-    <dgm:style>
-      <a:lnRef idx="2">
-        <a:scrgbClr r="0" g="0" b="0"/>
-      </a:lnRef>
-      <a:fillRef idx="0">
-        <a:scrgbClr r="0" g="0" b="0"/>
-      </a:fillRef>
-      <a:effectRef idx="0">
-        <a:scrgbClr r="0" g="0" b="0"/>
-      </a:effectRef>
-      <a:fontRef idx="minor"/>
-    </dgm:style>
-  </dgm:styleLbl>
-  <dgm:styleLbl name="fgAcc1">
-    <dgm:scene3d>
-      <a:camera prst="orthographicFront"/>
-      <a:lightRig rig="threePt" dir="t"/>
-    </dgm:scene3d>
-    <dgm:sp3d/>
-    <dgm:txPr/>
-    <dgm:style>
-      <a:lnRef idx="2">
-        <a:scrgbClr r="0" g="0" b="0"/>
-      </a:lnRef>
-      <a:fillRef idx="1">
-        <a:scrgbClr r="0" g="0" b="0"/>
-      </a:fillRef>
-      <a:effectRef idx="0">
-        <a:scrgbClr r="0" g="0" b="0"/>
-      </a:effectRef>
-      <a:fontRef idx="minor"/>
-    </dgm:style>
-  </dgm:styleLbl>
-  <dgm:styleLbl name="conFgAcc1">
-    <dgm:scene3d>
-      <a:camera prst="orthographicFront"/>
-      <a:lightRig rig="threePt" dir="t"/>
-    </dgm:scene3d>
-    <dgm:sp3d/>
-    <dgm:txPr/>
-    <dgm:style>
-      <a:lnRef idx="2">
-        <a:scrgbClr r="0" g="0" b="0"/>
-      </a:lnRef>
-      <a:fillRef idx="1">
-        <a:scrgbClr r="0" g="0" b="0"/>
-      </a:fillRef>
-      <a:effectRef idx="0">
-        <a:scrgbClr r="0" g="0" b="0"/>
-      </a:effectRef>
-      <a:fontRef idx="minor"/>
-    </dgm:style>
-  </dgm:styleLbl>
-  <dgm:styleLbl name="alignAcc1">
-    <dgm:scene3d>
-      <a:camera prst="orthographicFront"/>
-      <a:lightRig rig="threePt" dir="t"/>
-    </dgm:scene3d>
-    <dgm:sp3d/>
-    <dgm:txPr/>
-    <dgm:style>
-      <a:lnRef idx="2">
-        <a:scrgbClr r="0" g="0" b="0"/>
-      </a:lnRef>
-      <a:fillRef idx="1">
-        <a:scrgbClr r="0" g="0" b="0"/>
-      </a:fillRef>
-      <a:effectRef idx="0">
-        <a:scrgbClr r="0" g="0" b="0"/>
-      </a:effectRef>
-      <a:fontRef idx="minor"/>
-    </dgm:style>
-  </dgm:styleLbl>
-  <dgm:styleLbl name="trAlignAcc1">
-    <dgm:scene3d>
-      <a:camera prst="orthographicFront"/>
-      <a:lightRig rig="threePt" dir="t"/>
-    </dgm:scene3d>
-    <dgm:sp3d/>
-    <dgm:txPr/>
-    <dgm:style>
-      <a:lnRef idx="1">
-        <a:scrgbClr r="0" g="0" b="0"/>
-      </a:lnRef>
-      <a:fillRef idx="1">
-        <a:scrgbClr r="0" g="0" b="0"/>
-      </a:fillRef>
-      <a:effectRef idx="0">
-        <a:scrgbClr r="0" g="0" b="0"/>
-      </a:effectRef>
-      <a:fontRef idx="minor"/>
-    </dgm:style>
-  </dgm:styleLbl>
-  <dgm:styleLbl name="bgAcc1">
-    <dgm:scene3d>
-      <a:camera prst="orthographicFront"/>
-      <a:lightRig rig="threePt" dir="t"/>
-    </dgm:scene3d>
-    <dgm:sp3d/>
-    <dgm:txPr/>
-    <dgm:style>
-      <a:lnRef idx="2">
-        <a:scrgbClr r="0" g="0" b="0"/>
-      </a:lnRef>
-      <a:fillRef idx="1">
-        <a:scrgbClr r="0" g="0" b="0"/>
-      </a:fillRef>
-      <a:effectRef idx="0">
-        <a:scrgbClr r="0" g="0" b="0"/>
-      </a:effectRef>
-      <a:fontRef idx="minor"/>
-    </dgm:style>
-  </dgm:styleLbl>
-  <dgm:styleLbl name="solidFgAcc1">
-    <dgm:scene3d>
-      <a:camera prst="orthographicFront"/>
-      <a:lightRig rig="threePt" dir="t"/>
-    </dgm:scene3d>
-    <dgm:sp3d/>
-    <dgm:txPr/>
-    <dgm:style>
-      <a:lnRef idx="2">
-        <a:scrgbClr r="0" g="0" b="0"/>
-      </a:lnRef>
-      <a:fillRef idx="1">
-        <a:scrgbClr r="0" g="0" b="0"/>
-      </a:fillRef>
-      <a:effectRef idx="0">
-        <a:scrgbClr r="0" g="0" b="0"/>
-      </a:effectRef>
-      <a:fontRef idx="minor"/>
-    </dgm:style>
-  </dgm:styleLbl>
-  <dgm:styleLbl name="solidAlignAcc1">
-    <dgm:scene3d>
-      <a:camera prst="orthographicFront"/>
-      <a:lightRig rig="threePt" dir="t"/>
-    </dgm:scene3d>
-    <dgm:sp3d/>
-    <dgm:txPr/>
-    <dgm:style>
-      <a:lnRef idx="2">
-        <a:scrgbClr r="0" g="0" b="0"/>
-      </a:lnRef>
-      <a:fillRef idx="1">
-        <a:scrgbClr r="0" g="0" b="0"/>
-      </a:fillRef>
-      <a:effectRef idx="0">
-        <a:scrgbClr r="0" g="0" b="0"/>
-      </a:effectRef>
-      <a:fontRef idx="minor"/>
-    </dgm:style>
-  </dgm:styleLbl>
-  <dgm:styleLbl name="solidBgAcc1">
-    <dgm:scene3d>
-      <a:camera prst="orthographicFront"/>
-      <a:lightRig rig="threePt" dir="t"/>
-    </dgm:scene3d>
-    <dgm:sp3d/>
-    <dgm:txPr/>
-    <dgm:style>
-      <a:lnRef idx="2">
-        <a:scrgbClr r="0" g="0" b="0"/>
-      </a:lnRef>
-      <a:fillRef idx="1">
-        <a:scrgbClr r="0" g="0" b="0"/>
-      </a:fillRef>
-      <a:effectRef idx="0">
-        <a:scrgbClr r="0" g="0" b="0"/>
-      </a:effectRef>
-      <a:fontRef idx="minor"/>
-    </dgm:style>
-  </dgm:styleLbl>
-  <dgm:styleLbl name="fgAccFollowNode1">
-    <dgm:scene3d>
-      <a:camera prst="orthographicFront"/>
-      <a:lightRig rig="threePt" dir="t"/>
-    </dgm:scene3d>
-    <dgm:sp3d/>
-    <dgm:txPr/>
-    <dgm:style>
-      <a:lnRef idx="2">
-        <a:scrgbClr r="0" g="0" b="0"/>
-      </a:lnRef>
-      <a:fillRef idx="1">
-        <a:scrgbClr r="0" g="0" b="0"/>
-      </a:fillRef>
-      <a:effectRef idx="0">
-        <a:scrgbClr r="0" g="0" b="0"/>
-      </a:effectRef>
-      <a:fontRef idx="minor"/>
-    </dgm:style>
-  </dgm:styleLbl>
-  <dgm:styleLbl name="alignAccFollowNode1">
-    <dgm:scene3d>
-      <a:camera prst="orthographicFront"/>
-      <a:lightRig rig="threePt" dir="t"/>
-    </dgm:scene3d>
-    <dgm:sp3d/>
-    <dgm:txPr/>
-    <dgm:style>
-      <a:lnRef idx="2">
-        <a:scrgbClr r="0" g="0" b="0"/>
-      </a:lnRef>
-      <a:fillRef idx="1">
-        <a:scrgbClr r="0" g="0" b="0"/>
-      </a:fillRef>
-      <a:effectRef idx="0">
-        <a:scrgbClr r="0" g="0" b="0"/>
-      </a:effectRef>
-      <a:fontRef idx="minor"/>
-    </dgm:style>
-  </dgm:styleLbl>
-  <dgm:styleLbl name="bgAccFollowNode1">
-    <dgm:scene3d>
-      <a:camera prst="orthographicFront"/>
-      <a:lightRig rig="threePt" dir="t"/>
-    </dgm:scene3d>
-    <dgm:sp3d/>
-    <dgm:txPr/>
-    <dgm:style>
-      <a:lnRef idx="2">
-        <a:scrgbClr r="0" g="0" b="0"/>
-      </a:lnRef>
-      <a:fillRef idx="1">
-        <a:scrgbClr r="0" g="0" b="0"/>
-      </a:fillRef>
-      <a:effectRef idx="0">
-        <a:scrgbClr r="0" g="0" b="0"/>
-      </a:effectRef>
-      <a:fontRef idx="minor"/>
-    </dgm:style>
-  </dgm:styleLbl>
-  <dgm:styleLbl name="fgAcc0">
-    <dgm:scene3d>
-      <a:camera prst="orthographicFront"/>
-      <a:lightRig rig="threePt" dir="t"/>
-    </dgm:scene3d>
-    <dgm:sp3d/>
-    <dgm:txPr/>
-    <dgm:style>
-      <a:lnRef idx="2">
-        <a:scrgbClr r="0" g="0" b="0"/>
-      </a:lnRef>
-      <a:fillRef idx="1">
-        <a:scrgbClr r="0" g="0" b="0"/>
-      </a:fillRef>
-      <a:effectRef idx="0">
-        <a:scrgbClr r="0" g="0" b="0"/>
-      </a:effectRef>
-      <a:fontRef idx="minor"/>
-    </dgm:style>
-  </dgm:styleLbl>
-  <dgm:styleLbl name="fgAcc2">
-    <dgm:scene3d>
-      <a:camera prst="orthographicFront"/>
-      <a:lightRig rig="threePt" dir="t"/>
-    </dgm:scene3d>
-    <dgm:sp3d/>
-    <dgm:txPr/>
-    <dgm:style>
-      <a:lnRef idx="2">
-        <a:scrgbClr r="0" g="0" b="0"/>
-      </a:lnRef>
-      <a:fillRef idx="1">
-        <a:scrgbClr r="0" g="0" b="0"/>
-      </a:fillRef>
-      <a:effectRef idx="0">
-        <a:scrgbClr r="0" g="0" b="0"/>
-      </a:effectRef>
-      <a:fontRef idx="minor"/>
-    </dgm:style>
-  </dgm:styleLbl>
-  <dgm:styleLbl name="fgAcc3">
-    <dgm:scene3d>
-      <a:camera prst="orthographicFront"/>
-      <a:lightRig rig="threePt" dir="t"/>
-    </dgm:scene3d>
-    <dgm:sp3d/>
-    <dgm:txPr/>
-    <dgm:style>
-      <a:lnRef idx="2">
-        <a:scrgbClr r="0" g="0" b="0"/>
-      </a:lnRef>
-      <a:fillRef idx="1">
-        <a:scrgbClr r="0" g="0" b="0"/>
-      </a:fillRef>
-      <a:effectRef idx="0">
-        <a:scrgbClr r="0" g="0" b="0"/>
-      </a:effectRef>
-      <a:fontRef idx="minor"/>
-    </dgm:style>
-  </dgm:styleLbl>
-  <dgm:styleLbl name="fgAcc4">
-    <dgm:scene3d>
-      <a:camera prst="orthographicFront"/>
-      <a:lightRig rig="threePt" dir="t"/>
-    </dgm:scene3d>
-    <dgm:sp3d/>
-    <dgm:txPr/>
-    <dgm:style>
-      <a:lnRef idx="2">
-        <a:scrgbClr r="0" g="0" b="0"/>
-      </a:lnRef>
-      <a:fillRef idx="1">
-        <a:scrgbClr r="0" g="0" b="0"/>
-      </a:fillRef>
-      <a:effectRef idx="0">
-        <a:scrgbClr r="0" g="0" b="0"/>
-      </a:effectRef>
-      <a:fontRef idx="minor"/>
-    </dgm:style>
-  </dgm:styleLbl>
-  <dgm:styleLbl name="bgShp">
-    <dgm:scene3d>
-      <a:camera prst="orthographicFront"/>
-      <a:lightRig rig="threePt" dir="t"/>
-    </dgm:scene3d>
-    <dgm:sp3d/>
-    <dgm:txPr/>
-    <dgm:style>
-      <a:lnRef idx="0">
-        <a:scrgbClr r="0" g="0" b="0"/>
-      </a:lnRef>
-      <a:fillRef idx="1">
-        <a:scrgbClr r="0" g="0" b="0"/>
-      </a:fillRef>
-      <a:effectRef idx="0">
-        <a:scrgbClr r="0" g="0" b="0"/>
-      </a:effectRef>
-      <a:fontRef idx="minor"/>
-    </dgm:style>
-  </dgm:styleLbl>
-  <dgm:styleLbl name="dkBgShp">
-    <dgm:scene3d>
-      <a:camera prst="orthographicFront"/>
-      <a:lightRig rig="threePt" dir="t"/>
-    </dgm:scene3d>
-    <dgm:sp3d/>
-    <dgm:txPr/>
-    <dgm:style>
-      <a:lnRef idx="0">
-        <a:scrgbClr r="0" g="0" b="0"/>
-      </a:lnRef>
-      <a:fillRef idx="1">
-        <a:scrgbClr r="0" g="0" b="0"/>
-      </a:fillRef>
-      <a:effectRef idx="0">
-        <a:scrgbClr r="0" g="0" b="0"/>
-      </a:effectRef>
-      <a:fontRef idx="minor"/>
-    </dgm:style>
-  </dgm:styleLbl>
-  <dgm:styleLbl name="trBgShp">
-    <dgm:scene3d>
-      <a:camera prst="orthographicFront"/>
-      <a:lightRig rig="threePt" dir="t"/>
-    </dgm:scene3d>
-    <dgm:sp3d/>
-    <dgm:txPr/>
-    <dgm:style>
-      <a:lnRef idx="0">
-        <a:scrgbClr r="0" g="0" b="0"/>
-      </a:lnRef>
-      <a:fillRef idx="1">
-        <a:scrgbClr r="0" g="0" b="0"/>
-      </a:fillRef>
-      <a:effectRef idx="0">
-        <a:scrgbClr r="0" g="0" b="0"/>
-      </a:effectRef>
-      <a:fontRef idx="minor"/>
-    </dgm:style>
-  </dgm:styleLbl>
-  <dgm:styleLbl name="fgShp">
-    <dgm:scene3d>
-      <a:camera prst="orthographicFront"/>
-      <a:lightRig rig="threePt" dir="t"/>
-    </dgm:scene3d>
-    <dgm:sp3d/>
-    <dgm:txPr/>
-    <dgm:style>
-      <a:lnRef idx="2">
-        <a:scrgbClr r="0" g="0" b="0"/>
-      </a:lnRef>
-      <a:fillRef idx="1">
-        <a:scrgbClr r="0" g="0" b="0"/>
-      </a:fillRef>
-      <a:effectRef idx="0">
-        <a:scrgbClr r="0" g="0" b="0"/>
-      </a:effectRef>
-      <a:fontRef idx="minor"/>
-    </dgm:style>
-  </dgm:styleLbl>
-  <dgm:styleLbl name="revTx">
-    <dgm:scene3d>
-      <a:camera prst="orthographicFront"/>
-      <a:lightRig rig="threePt" dir="t"/>
-    </dgm:scene3d>
-    <dgm:sp3d/>
-    <dgm:txPr/>
-    <dgm:style>
-      <a:lnRef idx="0">
-        <a:scrgbClr r="0" g="0" b="0"/>
-      </a:lnRef>
-      <a:fillRef idx="0">
-        <a:scrgbClr r="0" g="0" b="0"/>
-      </a:fillRef>
-      <a:effectRef idx="0">
-        <a:scrgbClr r="0" g="0" b="0"/>
-      </a:effectRef>
-      <a:fontRef idx="minor"/>
-    </dgm:style>
-  </dgm:styleLbl>
-</dgm:styleDef>
+<file path=ppt/revisionInfo.xml><?xml version="1.0" encoding="utf-8"?>
+<p1510:revInfo xmlns:a="http://schemas.openxmlformats.org/drawingml/2006/main" xmlns:r="http://schemas.openxmlformats.org/officeDocument/2006/relationships" xmlns:p1510="http://schemas.microsoft.com/office/powerpoint/2015/10/main"/>
 </file>
 
 <file path=ppt/handoutMasters/handoutMaster1.xml><?xml version="1.0" encoding="utf-8"?>
@@ -2748,7 +269,7 @@
               <a:rPr lang="en-US" smtClean="0">
                 <a:latin typeface="Segoe UI" pitchFamily="34" charset="0"/>
               </a:rPr>
-              <a:t>11/10/2016 9:26 AM</a:t>
+              <a:t>3/24/2017 11:19 AM</a:t>
             </a:fld>
             <a:endParaRPr lang="en-US" dirty="0">
               <a:latin typeface="Segoe UI" pitchFamily="34" charset="0"/>
@@ -3029,7 +550,7 @@
           <a:p>
             <a:fld id="{38EEC551-8CDA-4EB6-89BB-2A86C9F091C8}" type="datetime8">
               <a:rPr lang="en-US" smtClean="0"/>
-              <a:t>11/10/2016 9:26 AM</a:t>
+              <a:t>3/24/2017 10:35 AM</a:t>
             </a:fld>
             <a:endParaRPr lang="en-US" dirty="0"/>
           </a:p>
@@ -3396,7 +917,7 @@
           <a:p>
             <a:fld id="{90EC29EE-A8AD-4CE0-9C0B-116E0D4D7533}" type="datetime8">
               <a:rPr lang="en-US" smtClean="0"/>
-              <a:t>11/10/2016 9:26 AM</a:t>
+              <a:t>3/24/2017 10:35 AM</a:t>
             </a:fld>
             <a:endParaRPr lang="en-US" dirty="0"/>
           </a:p>
@@ -3597,7 +1118,7 @@
           <a:p>
             <a:fld id="{38EEC551-8CDA-4EB6-89BB-2A86C9F091C8}" type="datetime8">
               <a:rPr lang="en-US" smtClean="0"/>
-              <a:t>11/10/2016 9:26 AM</a:t>
+              <a:t>3/24/2017 10:35 AM</a:t>
             </a:fld>
             <a:endParaRPr lang="en-US" dirty="0"/>
           </a:p>
@@ -17799,7 +15320,7 @@
 </file>
 
 <file path=ppt/slides/slide2.xml><?xml version="1.0" encoding="utf-8"?>
-<p:sld xmlns:a="http://schemas.openxmlformats.org/drawingml/2006/main" xmlns:r="http://schemas.openxmlformats.org/officeDocument/2006/relationships" xmlns:p="http://schemas.openxmlformats.org/presentationml/2006/main">
+<p:sld xmlns:a="http://schemas.openxmlformats.org/drawingml/2006/main" xmlns:r="http://schemas.openxmlformats.org/officeDocument/2006/relationships" xmlns:p="http://schemas.openxmlformats.org/presentationml/2006/main" show="0">
   <p:cSld>
     <p:spTree>
       <p:nvGrpSpPr>
@@ -17936,13 +15457,13 @@
   <p:clrMapOvr>
     <a:masterClrMapping/>
   </p:clrMapOvr>
-  <mc:AlternateContent xmlns:mc="http://schemas.openxmlformats.org/markup-compatibility/2006" xmlns:p14="http://schemas.microsoft.com/office/powerpoint/2010/main">
-    <mc:Choice Requires="p14">
+  <mc:AlternateContent xmlns:mc="http://schemas.openxmlformats.org/markup-compatibility/2006">
+    <mc:Choice xmlns:p14="http://schemas.microsoft.com/office/powerpoint/2010/main" Requires="p14">
       <p:transition spd="med" p14:dur="700">
         <p:fade/>
       </p:transition>
     </mc:Choice>
-    <mc:Fallback xmlns="">
+    <mc:Fallback>
       <p:transition spd="med">
         <p:fade/>
       </p:transition>
@@ -21553,115 +19074,56 @@
           </p:spPr>
         </p:pic>
       </p:grpSp>
-      <p:grpSp>
-        <p:nvGrpSpPr>
-          <p:cNvPr id="187" name="Group 186"/>
-          <p:cNvGrpSpPr/>
+      <p:sp>
+        <p:nvSpPr>
+          <p:cNvPr id="188" name="Rectangle 187"/>
+          <p:cNvSpPr/>
           <p:nvPr/>
-        </p:nvGrpSpPr>
-        <p:grpSpPr>
+        </p:nvSpPr>
+        <p:spPr>
           <a:xfrm>
             <a:off x="9477729" y="3136871"/>
             <a:ext cx="2563550" cy="621314"/>
-            <a:chOff x="2273389" y="3653513"/>
-            <a:chExt cx="2538168" cy="621314"/>
           </a:xfrm>
-        </p:grpSpPr>
-        <p:sp>
-          <p:nvSpPr>
-            <p:cNvPr id="188" name="Rectangle 187"/>
-            <p:cNvSpPr/>
-            <p:nvPr/>
-          </p:nvSpPr>
-          <p:spPr>
-            <a:xfrm>
-              <a:off x="2273389" y="3653513"/>
-              <a:ext cx="2538168" cy="621314"/>
-            </a:xfrm>
-            <a:prstGeom prst="rect">
+          <a:prstGeom prst="rect">
+            <a:avLst/>
+          </a:prstGeom>
+          <a:solidFill>
+            <a:srgbClr val="505050"/>
+          </a:solidFill>
+          <a:ln w="28575" cap="flat" cmpd="sng" algn="ctr">
+            <a:solidFill>
+              <a:sysClr val="window" lastClr="FFFFFF">
+                <a:lumMod val="75000"/>
+              </a:sysClr>
+            </a:solidFill>
+            <a:prstDash val="solid"/>
+          </a:ln>
+          <a:effectLst/>
+        </p:spPr>
+        <p:txBody>
+          <a:bodyPr rot="0" spcFirstLastPara="0" vertOverflow="overflow" horzOverflow="overflow" vert="horz" wrap="square" lIns="640080" tIns="0" rIns="0" bIns="0" numCol="1" spcCol="0" rtlCol="0" fromWordArt="0" anchor="ctr" anchorCtr="0" forceAA="0" compatLnSpc="1">
+            <a:prstTxWarp prst="textNoShape">
               <a:avLst/>
-            </a:prstGeom>
-            <a:solidFill>
-              <a:srgbClr val="505050"/>
-            </a:solidFill>
-            <a:ln w="28575" cap="flat" cmpd="sng" algn="ctr">
-              <a:solidFill>
-                <a:sysClr val="window" lastClr="FFFFFF">
-                  <a:lumMod val="75000"/>
-                </a:sysClr>
-              </a:solidFill>
-              <a:prstDash val="solid"/>
-            </a:ln>
-            <a:effectLst/>
-          </p:spPr>
-          <p:txBody>
-            <a:bodyPr rot="0" spcFirstLastPara="0" vertOverflow="overflow" horzOverflow="overflow" vert="horz" wrap="square" lIns="640080" tIns="0" rIns="0" bIns="0" numCol="1" spcCol="0" rtlCol="0" fromWordArt="0" anchor="ctr" anchorCtr="0" forceAA="0" compatLnSpc="1">
-              <a:prstTxWarp prst="textNoShape">
-                <a:avLst/>
-              </a:prstTxWarp>
-              <a:noAutofit/>
-            </a:bodyPr>
-            <a:lstStyle/>
-            <a:p>
-              <a:pPr marL="0" marR="0" lvl="0" indent="0" algn="ctr" defTabSz="896386" eaLnBrk="1" fontAlgn="auto" latinLnBrk="0" hangingPunct="1">
-                <a:lnSpc>
-                  <a:spcPct val="100000"/>
-                </a:lnSpc>
-                <a:spcBef>
-                  <a:spcPts val="0"/>
-                </a:spcBef>
-                <a:spcAft>
-                  <a:spcPts val="0"/>
-                </a:spcAft>
-                <a:buClrTx/>
-                <a:buSzTx/>
-                <a:buFontTx/>
-                <a:buNone/>
-                <a:tabLst/>
-                <a:defRPr/>
-              </a:pPr>
-              <a:r>
-                <a:rPr kumimoji="0" lang="en-US" sz="1600" b="0" i="0" u="none" strike="noStrike" kern="0" cap="none" spc="0" normalizeH="0" baseline="0" noProof="0" dirty="0">
-                  <a:ln>
-                    <a:noFill/>
-                  </a:ln>
-                  <a:solidFill>
-                    <a:prstClr val="white"/>
-                  </a:solidFill>
-                  <a:effectLst/>
-                  <a:uLnTx/>
-                  <a:uFillTx/>
-                </a:rPr>
-                <a:t>Batch</a:t>
-              </a:r>
-            </a:p>
-          </p:txBody>
-        </p:sp>
-        <p:pic>
-          <p:nvPicPr>
-            <p:cNvPr id="189" name="Picture 188"/>
-            <p:cNvPicPr>
-              <a:picLocks noChangeAspect="1"/>
-            </p:cNvPicPr>
-            <p:nvPr/>
-          </p:nvPicPr>
-          <p:blipFill>
-            <a:blip r:embed="rId8"/>
-            <a:stretch>
-              <a:fillRect/>
-            </a:stretch>
-          </p:blipFill>
-          <p:spPr>
-            <a:xfrm>
-              <a:off x="2366881" y="3720680"/>
-              <a:ext cx="534650" cy="495720"/>
-            </a:xfrm>
-            <a:prstGeom prst="rect">
-              <a:avLst/>
-            </a:prstGeom>
-          </p:spPr>
-        </p:pic>
-      </p:grpSp>
+            </a:prstTxWarp>
+            <a:noAutofit/>
+          </a:bodyPr>
+          <a:lstStyle/>
+          <a:p>
+            <a:pPr algn="ctr" defTabSz="896386">
+              <a:defRPr/>
+            </a:pPr>
+            <a:r>
+              <a:rPr lang="en-US" sz="1600" kern="0" dirty="0">
+                <a:solidFill>
+                  <a:prstClr val="white"/>
+                </a:solidFill>
+              </a:rPr>
+              <a:t>coming soon</a:t>
+            </a:r>
+          </a:p>
+        </p:txBody>
+      </p:sp>
       <p:grpSp>
         <p:nvGrpSpPr>
           <p:cNvPr id="190" name="Group 189"/>
@@ -21755,7 +19217,7 @@
             <p:nvPr/>
           </p:nvPicPr>
           <p:blipFill>
-            <a:blip r:embed="rId9"/>
+            <a:blip r:embed="rId8"/>
             <a:stretch>
               <a:fillRect/>
             </a:stretch>
@@ -21836,7 +19298,7 @@
                 <a:uLnTx/>
                 <a:uFillTx/>
               </a:rPr>
-              <a:t>coming soon</a:t>
+              <a:t>…</a:t>
             </a:r>
           </a:p>
         </p:txBody>
@@ -22145,7 +19607,7 @@
             <p:nvPr/>
           </p:nvPicPr>
           <p:blipFill>
-            <a:blip r:embed="rId10"/>
+            <a:blip r:embed="rId9"/>
             <a:stretch>
               <a:fillRect/>
             </a:stretch>
@@ -22332,7 +19794,7 @@
             <p:nvPr/>
           </p:nvPicPr>
           <p:blipFill>
-            <a:blip r:embed="rId11">
+            <a:blip r:embed="rId10">
               <a:extLst>
                 <a:ext uri="{28A0092B-C50C-407E-A947-70E740481C1C}">
                   <a14:useLocalDpi xmlns:a14="http://schemas.microsoft.com/office/drawing/2010/main" val="0"/>
@@ -22373,11 +19835,11 @@
             <p:nvPr/>
           </p:nvPicPr>
           <p:blipFill>
-            <a:blip r:embed="rId12">
+            <a:blip r:embed="rId11">
               <a:extLst>
                 <a:ext uri="{BEBA8EAE-BF5A-486C-A8C5-ECC9F3942E4B}">
                   <a14:imgProps xmlns:a14="http://schemas.microsoft.com/office/drawing/2010/main">
-                    <a14:imgLayer r:embed="rId13">
+                    <a14:imgLayer r:embed="rId12">
                       <a14:imgEffect>
                         <a14:backgroundRemoval t="10000" b="90000" l="10000" r="90000"/>
                       </a14:imgEffect>
@@ -22480,7 +19942,7 @@
           <p:nvPr/>
         </p:nvPicPr>
         <p:blipFill>
-          <a:blip r:embed="rId11">
+          <a:blip r:embed="rId10">
             <a:extLst>
               <a:ext uri="{28A0092B-C50C-407E-A947-70E740481C1C}">
                 <a14:useLocalDpi xmlns:a14="http://schemas.microsoft.com/office/drawing/2010/main" val="0"/>
@@ -22784,7 +20246,7 @@
           <p:nvPr/>
         </p:nvPicPr>
         <p:blipFill>
-          <a:blip r:embed="rId11">
+          <a:blip r:embed="rId10">
             <a:extLst>
               <a:ext uri="{28A0092B-C50C-407E-A947-70E740481C1C}">
                 <a14:useLocalDpi xmlns:a14="http://schemas.microsoft.com/office/drawing/2010/main" val="0"/>
@@ -23054,7 +20516,7 @@
             <p:nvPr/>
           </p:nvPicPr>
           <p:blipFill>
-            <a:blip r:embed="rId14"/>
+            <a:blip r:embed="rId13"/>
             <a:stretch>
               <a:fillRect/>
             </a:stretch>
@@ -23117,7 +20579,7 @@
             <p:nvPr/>
           </p:nvPicPr>
           <p:blipFill rotWithShape="1">
-            <a:blip r:embed="rId15" cstate="print">
+            <a:blip r:embed="rId14" cstate="print">
               <a:extLst>
                 <a:ext uri="{28A0092B-C50C-407E-A947-70E740481C1C}">
                   <a14:useLocalDpi xmlns:a14="http://schemas.microsoft.com/office/drawing/2010/main" val="0"/>
@@ -23157,7 +20619,7 @@
           <p:nvPr/>
         </p:nvPicPr>
         <p:blipFill>
-          <a:blip r:embed="rId16"/>
+          <a:blip r:embed="rId15"/>
           <a:stretch>
             <a:fillRect/>
           </a:stretch>
@@ -24252,7 +21714,7 @@
                             </p:stCondLst>
                             <p:childTnLst>
                               <p:par>
-                                <p:cTn id="92" presetID="22" presetClass="entr" presetSubtype="8" fill="hold" nodeType="afterEffect">
+                                <p:cTn id="92" presetID="22" presetClass="entr" presetSubtype="8" fill="hold" grpId="0" nodeType="afterEffect">
                                   <p:stCondLst>
                                     <p:cond delay="0"/>
                                   </p:stCondLst>
@@ -24265,7 +21727,7 @@
                                           </p:stCondLst>
                                         </p:cTn>
                                         <p:tgtEl>
-                                          <p:spTgt spid="187"/>
+                                          <p:spTgt spid="188"/>
                                         </p:tgtEl>
                                         <p:attrNameLst>
                                           <p:attrName>style.visibility</p:attrName>
@@ -24279,7 +21741,7 @@
                                       <p:cBhvr>
                                         <p:cTn id="94" dur="500"/>
                                         <p:tgtEl>
-                                          <p:spTgt spid="187"/>
+                                          <p:spTgt spid="188"/>
                                         </p:tgtEl>
                                       </p:cBhvr>
                                     </p:animEffect>
@@ -24540,6 +22002,7 @@
       <p:bldP spid="157" grpId="0" animBg="1"/>
       <p:bldP spid="158" grpId="0" animBg="1"/>
       <p:bldP spid="160" grpId="0" animBg="1"/>
+      <p:bldP spid="188" grpId="0" animBg="1"/>
       <p:bldP spid="194" grpId="0" animBg="1"/>
       <p:bldP spid="197" grpId="0" animBg="1"/>
       <p:bldP spid="200" grpId="0" animBg="1"/>
@@ -24617,13 +22080,13 @@
   <p:clrMapOvr>
     <a:masterClrMapping/>
   </p:clrMapOvr>
-  <mc:AlternateContent xmlns:mc="http://schemas.openxmlformats.org/markup-compatibility/2006">
-    <mc:Choice xmlns:p14="http://schemas.microsoft.com/office/powerpoint/2010/main" Requires="p14">
+  <mc:AlternateContent xmlns:mc="http://schemas.openxmlformats.org/markup-compatibility/2006" xmlns:p14="http://schemas.microsoft.com/office/powerpoint/2010/main">
+    <mc:Choice Requires="p14">
       <p:transition spd="slow">
         <p14:reveal/>
       </p:transition>
     </mc:Choice>
-    <mc:Fallback>
+    <mc:Fallback xmlns="">
       <p:transition spd="slow">
         <p:fade/>
       </p:transition>
@@ -24883,28 +22346,6 @@
           </a:prstGeom>
         </p:spPr>
       </p:pic>
-      <p:graphicFrame>
-        <p:nvGraphicFramePr>
-          <p:cNvPr id="7" name="Diagram 6"/>
-          <p:cNvGraphicFramePr/>
-          <p:nvPr>
-            <p:extLst>
-              <p:ext uri="{D42A27DB-BD31-4B8C-83A1-F6EECF244321}">
-                <p14:modId xmlns:p14="http://schemas.microsoft.com/office/powerpoint/2010/main" val="1020413671"/>
-              </p:ext>
-            </p:extLst>
-          </p:nvPr>
-        </p:nvGraphicFramePr>
-        <p:xfrm>
-          <a:off x="7513637" y="295274"/>
-          <a:ext cx="4726313" cy="1041659"/>
-        </p:xfrm>
-        <a:graphic>
-          <a:graphicData uri="http://schemas.openxmlformats.org/drawingml/2006/diagram">
-            <dgm:relIds xmlns:dgm="http://schemas.openxmlformats.org/drawingml/2006/diagram" xmlns:r="http://schemas.openxmlformats.org/officeDocument/2006/relationships" r:dm="rId3" r:lo="rId4" r:qs="rId5" r:cs="rId6"/>
-          </a:graphicData>
-        </a:graphic>
-      </p:graphicFrame>
       <p:sp>
         <p:nvSpPr>
           <p:cNvPr id="5" name="Text Placeholder 4"/>
@@ -24930,13 +22371,13 @@
             </a:pPr>
             <a:r>
               <a:rPr lang="en-US" sz="2800" dirty="0">
-                <a:hlinkClick r:id="rId8"/>
+                <a:hlinkClick r:id="rId3"/>
               </a:rPr>
               <a:t>aka.ms/</a:t>
             </a:r>
             <a:r>
               <a:rPr lang="en-US" sz="2800" dirty="0" err="1">
-                <a:hlinkClick r:id="rId8"/>
+                <a:hlinkClick r:id="rId3"/>
               </a:rPr>
               <a:t>AzureContainerRegistry</a:t>
             </a:r>
@@ -26143,93 +23584,6 @@
 </file>
 
 <file path=customXml/item1.xml><?xml version="1.0" encoding="utf-8"?>
-<p:properties xmlns:p="http://schemas.microsoft.com/office/2006/metadata/properties" xmlns:xsi="http://www.w3.org/2001/XMLSchema-instance" xmlns:pc="http://schemas.microsoft.com/office/infopath/2007/PartnerControls">
-  <documentManagement>
-    <LikesCount xmlns="http://schemas.microsoft.com/sharepoint/v3" xsi:nil="true"/>
-    <d12e2661e9634d9aa98bbb375f31aced xmlns="01c77077-aee4-4b5f-bd4e-9cd40a6fff29">
-      <Terms xmlns="http://schemas.microsoft.com/office/infopath/2007/PartnerControls">
-        <TermInfo xmlns="http://schemas.microsoft.com/office/infopath/2007/PartnerControls">
-          <TermName xmlns="http://schemas.microsoft.com/office/infopath/2007/PartnerControls">Moscone Center</TermName>
-          <TermId xmlns="http://schemas.microsoft.com/office/infopath/2007/PartnerControls">d4f36a2e-dd0d-4424-990f-7c93b4e9f063</TermId>
-        </TermInfo>
-      </Terms>
-    </d12e2661e9634d9aa98bbb375f31aced>
-    <Event_x0020_Start_x0020_Date xmlns="01c77077-aee4-4b5f-bd4e-9cd40a6fff29">2016-03-30T07:00:00+00:00</Event_x0020_Start_x0020_Date>
-    <Target_x0020_Audiences xmlns="8ff673fc-3231-4e3a-893b-6d7f7cd32766" xsi:nil="true"/>
-    <iaa5f83406f94009a0f6a3e890699ff7 xmlns="01c77077-aee4-4b5f-bd4e-9cd40a6fff29">
-      <Terms xmlns="http://schemas.microsoft.com/office/infopath/2007/PartnerControls">
-        <TermInfo xmlns="http://schemas.microsoft.com/office/infopath/2007/PartnerControls">
-          <TermName xmlns="http://schemas.microsoft.com/office/infopath/2007/PartnerControls">San Francisco</TermName>
-          <TermId xmlns="http://schemas.microsoft.com/office/infopath/2007/PartnerControls">84dfcb53-432b-499d-8965-93d483d36b4a</TermId>
-        </TermInfo>
-      </Terms>
-    </iaa5f83406f94009a0f6a3e890699ff7>
-    <External_x0020_Speaker xmlns="01c77077-aee4-4b5f-bd4e-9cd40a6fff29" xsi:nil="true"/>
-    <m6878b9dd7994da4ba144f95347d99c6 xmlns="01c77077-aee4-4b5f-bd4e-9cd40a6fff29">
-      <Terms xmlns="http://schemas.microsoft.com/office/infopath/2007/PartnerControls"/>
-    </m6878b9dd7994da4ba144f95347d99c6>
-    <Presentation_x0020_Date xmlns="01c77077-aee4-4b5f-bd4e-9cd40a6fff29" xsi:nil="true"/>
-    <fc15c16204564de583b4c942b10d19ec xmlns="01c77077-aee4-4b5f-bd4e-9cd40a6fff29">
-      <Terms xmlns="http://schemas.microsoft.com/office/infopath/2007/PartnerControls"/>
-    </fc15c16204564de583b4c942b10d19ec>
-    <mb2e01f7e2d8413988e28e59aa226eec xmlns="01c77077-aee4-4b5f-bd4e-9cd40a6fff29">
-      <Terms xmlns="http://schemas.microsoft.com/office/infopath/2007/PartnerControls">
-        <TermInfo xmlns="http://schemas.microsoft.com/office/infopath/2007/PartnerControls">
-          <TermName xmlns="http://schemas.microsoft.com/office/infopath/2007/PartnerControls">Build</TermName>
-          <TermId xmlns="http://schemas.microsoft.com/office/infopath/2007/PartnerControls">58542b36-5bf5-46a6-a53f-a41fb7a73785</TermId>
-        </TermInfo>
-      </Terms>
-    </mb2e01f7e2d8413988e28e59aa226eec>
-    <MS_x0020_Content_x0020_Owner xmlns="01c77077-aee4-4b5f-bd4e-9cd40a6fff29">
-      <UserInfo>
-        <DisplayName/>
-        <AccountId xsi:nil="true"/>
-        <AccountType/>
-      </UserInfo>
-    </MS_x0020_Content_x0020_Owner>
-    <Session_x0020_Code xmlns="01c77077-aee4-4b5f-bd4e-9cd40a6fff29" xsi:nil="true"/>
-    <Event_x0020_End_x0020_Date xmlns="01c77077-aee4-4b5f-bd4e-9cd40a6fff29">2016-04-01T07:00:00+00:00</Event_x0020_End_x0020_Date>
-    <o1010385baed4da9b5076a6aa651d1e5 xmlns="01c77077-aee4-4b5f-bd4e-9cd40a6fff29">
-      <Terms xmlns="http://schemas.microsoft.com/office/infopath/2007/PartnerControls"/>
-    </o1010385baed4da9b5076a6aa651d1e5>
-    <kc6d1bd9a46e4e5fbbbf99ca3de7a092 xmlns="01c77077-aee4-4b5f-bd4e-9cd40a6fff29">
-      <Terms xmlns="http://schemas.microsoft.com/office/infopath/2007/PartnerControls"/>
-    </kc6d1bd9a46e4e5fbbbf99ca3de7a092>
-    <MS_x0020_Speaker xmlns="01c77077-aee4-4b5f-bd4e-9cd40a6fff29">
-      <UserInfo>
-        <DisplayName/>
-        <AccountId xsi:nil="true"/>
-        <AccountType/>
-      </UserInfo>
-    </MS_x0020_Speaker>
-    <TaxKeywordTaxHTField xmlns="230e9df3-be65-4c73-a93b-d1236ebd677e">
-      <Terms xmlns="http://schemas.microsoft.com/office/infopath/2007/PartnerControls">
-        <TermInfo xmlns="http://schemas.microsoft.com/office/infopath/2007/PartnerControls">
-          <TermName xmlns="http://schemas.microsoft.com/office/infopath/2007/PartnerControls">Microsoft Build 2016</TermName>
-          <TermId xmlns="http://schemas.microsoft.com/office/infopath/2007/PartnerControls">da8a10b5-9bc3-4217-80aa-6b60d6ec1cee</TermId>
-        </TermInfo>
-      </Terms>
-    </TaxKeywordTaxHTField>
-    <TaxCatchAll xmlns="230e9df3-be65-4c73-a93b-d1236ebd677e">
-      <Value>48</Value>
-      <Value>47</Value>
-      <Value>46</Value>
-      <Value>49</Value>
-    </TaxCatchAll>
-  </documentManagement>
-</p:properties>
-</file>
-
-<file path=customXml/item2.xml><?xml version="1.0" encoding="utf-8"?>
-<?mso-contentType ?>
-<FormTemplates xmlns="http://schemas.microsoft.com/sharepoint/v3/contenttype/forms">
-  <Display>DocumentLibraryForm</Display>
-  <Edit>DocumentLibraryForm</Edit>
-  <New>DocumentLibraryForm</New>
-</FormTemplates>
-</file>
-
-<file path=customXml/item3.xml><?xml version="1.0" encoding="utf-8"?>
 <ct:contentTypeSchema xmlns:ct="http://schemas.microsoft.com/office/2006/metadata/contentType" xmlns:ma="http://schemas.microsoft.com/office/2006/metadata/properties/metaAttributes" ct:_="" ma:_="" ma:contentTypeName="PresentationsDoc" ma:contentTypeID="0x01010031DCF4CA090F824DB1E4CCBB6B9D64EA00101E8AAD132F8F4D96340D6376C8BB3E" ma:contentTypeVersion="21" ma:contentTypeDescription="" ma:contentTypeScope="" ma:versionID="264624295c8b52c397a103286eb3d87c">
   <xsd:schema xmlns:xsd="http://www.w3.org/2001/XMLSchema" xmlns:xs="http://www.w3.org/2001/XMLSchema" xmlns:p="http://schemas.microsoft.com/office/2006/metadata/properties" xmlns:ns1="http://schemas.microsoft.com/sharepoint/v3" xmlns:ns2="01c77077-aee4-4b5f-bd4e-9cd40a6fff29" xmlns:ns3="230e9df3-be65-4c73-a93b-d1236ebd677e" xmlns:ns5="8ff673fc-3231-4e3a-893b-6d7f7cd32766" targetNamespace="http://schemas.microsoft.com/office/2006/metadata/properties" ma:root="true" ma:fieldsID="795b20f19f95dfa6d1f4d708b4ec8d36" ns1:_="" ns2:_="" ns3:_="" ns5:_="">
     <xsd:import namespace="http://schemas.microsoft.com/sharepoint/v3"/>
@@ -26578,34 +23932,94 @@
 </ct:contentTypeSchema>
 </file>
 
-<file path=customXml/itemProps1.xml><?xml version="1.0" encoding="utf-8"?>
-<ds:datastoreItem xmlns:ds="http://schemas.openxmlformats.org/officeDocument/2006/customXml" ds:itemID="{F990F116-B58F-4255-B05B-DA3808E0E5C6}">
-  <ds:schemaRefs>
-    <ds:schemaRef ds:uri="01c77077-aee4-4b5f-bd4e-9cd40a6fff29"/>
-    <ds:schemaRef ds:uri="230e9df3-be65-4c73-a93b-d1236ebd677e"/>
-    <ds:schemaRef ds:uri="http://purl.org/dc/terms/"/>
-    <ds:schemaRef ds:uri="8ff673fc-3231-4e3a-893b-6d7f7cd32766"/>
-    <ds:schemaRef ds:uri="http://schemas.microsoft.com/office/2006/documentManagement/types"/>
-    <ds:schemaRef ds:uri="http://schemas.microsoft.com/office/infopath/2007/PartnerControls"/>
-    <ds:schemaRef ds:uri="http://schemas.openxmlformats.org/package/2006/metadata/core-properties"/>
-    <ds:schemaRef ds:uri="http://purl.org/dc/elements/1.1/"/>
-    <ds:schemaRef ds:uri="http://schemas.microsoft.com/office/2006/metadata/properties"/>
-    <ds:schemaRef ds:uri="http://schemas.microsoft.com/sharepoint/v3"/>
-    <ds:schemaRef ds:uri="http://www.w3.org/XML/1998/namespace"/>
-    <ds:schemaRef ds:uri="http://purl.org/dc/dcmitype/"/>
-  </ds:schemaRefs>
-</ds:datastoreItem>
+<file path=customXml/item2.xml><?xml version="1.0" encoding="utf-8"?>
+<?mso-contentType ?>
+<FormTemplates xmlns="http://schemas.microsoft.com/sharepoint/v3/contenttype/forms">
+  <Display>DocumentLibraryForm</Display>
+  <Edit>DocumentLibraryForm</Edit>
+  <New>DocumentLibraryForm</New>
+</FormTemplates>
 </file>
 
-<file path=customXml/itemProps2.xml><?xml version="1.0" encoding="utf-8"?>
-<ds:datastoreItem xmlns:ds="http://schemas.openxmlformats.org/officeDocument/2006/customXml" ds:itemID="{758FDAC0-319D-4A54-8D8E-1D42CB1F8004}">
-  <ds:schemaRefs>
-    <ds:schemaRef ds:uri="http://schemas.microsoft.com/sharepoint/v3/contenttype/forms"/>
-  </ds:schemaRefs>
-</ds:datastoreItem>
+<file path=customXml/item3.xml><?xml version="1.0" encoding="utf-8"?>
+<p:properties xmlns:p="http://schemas.microsoft.com/office/2006/metadata/properties" xmlns:xsi="http://www.w3.org/2001/XMLSchema-instance" xmlns:pc="http://schemas.microsoft.com/office/infopath/2007/PartnerControls">
+  <documentManagement>
+    <LikesCount xmlns="http://schemas.microsoft.com/sharepoint/v3" xsi:nil="true"/>
+    <d12e2661e9634d9aa98bbb375f31aced xmlns="01c77077-aee4-4b5f-bd4e-9cd40a6fff29">
+      <Terms xmlns="http://schemas.microsoft.com/office/infopath/2007/PartnerControls">
+        <TermInfo xmlns="http://schemas.microsoft.com/office/infopath/2007/PartnerControls">
+          <TermName xmlns="http://schemas.microsoft.com/office/infopath/2007/PartnerControls">Moscone Center</TermName>
+          <TermId xmlns="http://schemas.microsoft.com/office/infopath/2007/PartnerControls">d4f36a2e-dd0d-4424-990f-7c93b4e9f063</TermId>
+        </TermInfo>
+      </Terms>
+    </d12e2661e9634d9aa98bbb375f31aced>
+    <Event_x0020_Start_x0020_Date xmlns="01c77077-aee4-4b5f-bd4e-9cd40a6fff29">2016-03-30T07:00:00+00:00</Event_x0020_Start_x0020_Date>
+    <Target_x0020_Audiences xmlns="8ff673fc-3231-4e3a-893b-6d7f7cd32766" xsi:nil="true"/>
+    <iaa5f83406f94009a0f6a3e890699ff7 xmlns="01c77077-aee4-4b5f-bd4e-9cd40a6fff29">
+      <Terms xmlns="http://schemas.microsoft.com/office/infopath/2007/PartnerControls">
+        <TermInfo xmlns="http://schemas.microsoft.com/office/infopath/2007/PartnerControls">
+          <TermName xmlns="http://schemas.microsoft.com/office/infopath/2007/PartnerControls">San Francisco</TermName>
+          <TermId xmlns="http://schemas.microsoft.com/office/infopath/2007/PartnerControls">84dfcb53-432b-499d-8965-93d483d36b4a</TermId>
+        </TermInfo>
+      </Terms>
+    </iaa5f83406f94009a0f6a3e890699ff7>
+    <External_x0020_Speaker xmlns="01c77077-aee4-4b5f-bd4e-9cd40a6fff29" xsi:nil="true"/>
+    <m6878b9dd7994da4ba144f95347d99c6 xmlns="01c77077-aee4-4b5f-bd4e-9cd40a6fff29">
+      <Terms xmlns="http://schemas.microsoft.com/office/infopath/2007/PartnerControls"/>
+    </m6878b9dd7994da4ba144f95347d99c6>
+    <Presentation_x0020_Date xmlns="01c77077-aee4-4b5f-bd4e-9cd40a6fff29" xsi:nil="true"/>
+    <fc15c16204564de583b4c942b10d19ec xmlns="01c77077-aee4-4b5f-bd4e-9cd40a6fff29">
+      <Terms xmlns="http://schemas.microsoft.com/office/infopath/2007/PartnerControls"/>
+    </fc15c16204564de583b4c942b10d19ec>
+    <mb2e01f7e2d8413988e28e59aa226eec xmlns="01c77077-aee4-4b5f-bd4e-9cd40a6fff29">
+      <Terms xmlns="http://schemas.microsoft.com/office/infopath/2007/PartnerControls">
+        <TermInfo xmlns="http://schemas.microsoft.com/office/infopath/2007/PartnerControls">
+          <TermName xmlns="http://schemas.microsoft.com/office/infopath/2007/PartnerControls">Build</TermName>
+          <TermId xmlns="http://schemas.microsoft.com/office/infopath/2007/PartnerControls">58542b36-5bf5-46a6-a53f-a41fb7a73785</TermId>
+        </TermInfo>
+      </Terms>
+    </mb2e01f7e2d8413988e28e59aa226eec>
+    <MS_x0020_Content_x0020_Owner xmlns="01c77077-aee4-4b5f-bd4e-9cd40a6fff29">
+      <UserInfo>
+        <DisplayName/>
+        <AccountId xsi:nil="true"/>
+        <AccountType/>
+      </UserInfo>
+    </MS_x0020_Content_x0020_Owner>
+    <Session_x0020_Code xmlns="01c77077-aee4-4b5f-bd4e-9cd40a6fff29" xsi:nil="true"/>
+    <Event_x0020_End_x0020_Date xmlns="01c77077-aee4-4b5f-bd4e-9cd40a6fff29">2016-04-01T07:00:00+00:00</Event_x0020_End_x0020_Date>
+    <o1010385baed4da9b5076a6aa651d1e5 xmlns="01c77077-aee4-4b5f-bd4e-9cd40a6fff29">
+      <Terms xmlns="http://schemas.microsoft.com/office/infopath/2007/PartnerControls"/>
+    </o1010385baed4da9b5076a6aa651d1e5>
+    <kc6d1bd9a46e4e5fbbbf99ca3de7a092 xmlns="01c77077-aee4-4b5f-bd4e-9cd40a6fff29">
+      <Terms xmlns="http://schemas.microsoft.com/office/infopath/2007/PartnerControls"/>
+    </kc6d1bd9a46e4e5fbbbf99ca3de7a092>
+    <MS_x0020_Speaker xmlns="01c77077-aee4-4b5f-bd4e-9cd40a6fff29">
+      <UserInfo>
+        <DisplayName/>
+        <AccountId xsi:nil="true"/>
+        <AccountType/>
+      </UserInfo>
+    </MS_x0020_Speaker>
+    <TaxKeywordTaxHTField xmlns="230e9df3-be65-4c73-a93b-d1236ebd677e">
+      <Terms xmlns="http://schemas.microsoft.com/office/infopath/2007/PartnerControls">
+        <TermInfo xmlns="http://schemas.microsoft.com/office/infopath/2007/PartnerControls">
+          <TermName xmlns="http://schemas.microsoft.com/office/infopath/2007/PartnerControls">Microsoft Build 2016</TermName>
+          <TermId xmlns="http://schemas.microsoft.com/office/infopath/2007/PartnerControls">da8a10b5-9bc3-4217-80aa-6b60d6ec1cee</TermId>
+        </TermInfo>
+      </Terms>
+    </TaxKeywordTaxHTField>
+    <TaxCatchAll xmlns="230e9df3-be65-4c73-a93b-d1236ebd677e">
+      <Value>48</Value>
+      <Value>47</Value>
+      <Value>46</Value>
+      <Value>49</Value>
+    </TaxCatchAll>
+  </documentManagement>
+</p:properties>
 </file>
 
-<file path=customXml/itemProps3.xml><?xml version="1.0" encoding="utf-8"?>
+<file path=customXml/itemProps1.xml><?xml version="1.0" encoding="utf-8"?>
 <ds:datastoreItem xmlns:ds="http://schemas.openxmlformats.org/officeDocument/2006/customXml" ds:itemID="{BAA4D29B-0199-4083-B6CB-53559E57A3C1}">
   <ds:schemaRefs>
     <ds:schemaRef ds:uri="http://schemas.microsoft.com/office/2006/metadata/contentType"/>
@@ -26624,4 +24038,31 @@
     <ds:schemaRef ds:uri="http://schemas.microsoft.com/internal/obd"/>
   </ds:schemaRefs>
 </ds:datastoreItem>
+</file>
+
+<file path=customXml/itemProps2.xml><?xml version="1.0" encoding="utf-8"?>
+<ds:datastoreItem xmlns:ds="http://schemas.openxmlformats.org/officeDocument/2006/customXml" ds:itemID="{758FDAC0-319D-4A54-8D8E-1D42CB1F8004}">
+  <ds:schemaRefs>
+    <ds:schemaRef ds:uri="http://schemas.microsoft.com/sharepoint/v3/contenttype/forms"/>
+  </ds:schemaRefs>
+</ds:datastoreItem>
+</file>
+
+<file path=customXml/itemProps3.xml><?xml version="1.0" encoding="utf-8"?>
+<ds:datastoreItem xmlns:ds="http://schemas.openxmlformats.org/officeDocument/2006/customXml" ds:itemID="{F990F116-B58F-4255-B05B-DA3808E0E5C6}">
+  <ds:schemaRefs>
+    <ds:schemaRef ds:uri="http://schemas.microsoft.com/sharepoint/v3"/>
+    <ds:schemaRef ds:uri="http://purl.org/dc/terms/"/>
+    <ds:schemaRef ds:uri="http://schemas.microsoft.com/office/2006/documentManagement/types"/>
+    <ds:schemaRef ds:uri="http://purl.org/dc/dcmitype/"/>
+    <ds:schemaRef ds:uri="http://schemas.openxmlformats.org/package/2006/metadata/core-properties"/>
+    <ds:schemaRef ds:uri="8ff673fc-3231-4e3a-893b-6d7f7cd32766"/>
+    <ds:schemaRef ds:uri="http://purl.org/dc/elements/1.1/"/>
+    <ds:schemaRef ds:uri="http://schemas.microsoft.com/office/2006/metadata/properties"/>
+    <ds:schemaRef ds:uri="230e9df3-be65-4c73-a93b-d1236ebd677e"/>
+    <ds:schemaRef ds:uri="http://schemas.microsoft.com/office/infopath/2007/PartnerControls"/>
+    <ds:schemaRef ds:uri="01c77077-aee4-4b5f-bd4e-9cd40a6fff29"/>
+    <ds:schemaRef ds:uri="http://www.w3.org/XML/1998/namespace"/>
+  </ds:schemaRefs>
+</ds:datastoreItem>
 </file>
</xml_diff>